<commit_message>
Added Graph and Concluded lines
</commit_message>
<xml_diff>
--- a/Presentation.pptx
+++ b/Presentation.pptx
@@ -4,8 +4,30 @@
   <p:sldMasterIdLst>
     <p:sldMasterId id="2147483648" r:id="rId1"/>
   </p:sldMasterIdLst>
+  <p:notesMasterIdLst>
+    <p:notesMasterId r:id="rId22"/>
+  </p:notesMasterIdLst>
   <p:sldIdLst>
     <p:sldId id="256" r:id="rId2"/>
+    <p:sldId id="261" r:id="rId3"/>
+    <p:sldId id="257" r:id="rId4"/>
+    <p:sldId id="259" r:id="rId5"/>
+    <p:sldId id="258" r:id="rId6"/>
+    <p:sldId id="260" r:id="rId7"/>
+    <p:sldId id="262" r:id="rId8"/>
+    <p:sldId id="263" r:id="rId9"/>
+    <p:sldId id="264" r:id="rId10"/>
+    <p:sldId id="265" r:id="rId11"/>
+    <p:sldId id="266" r:id="rId12"/>
+    <p:sldId id="267" r:id="rId13"/>
+    <p:sldId id="268" r:id="rId14"/>
+    <p:sldId id="270" r:id="rId15"/>
+    <p:sldId id="271" r:id="rId16"/>
+    <p:sldId id="272" r:id="rId17"/>
+    <p:sldId id="273" r:id="rId18"/>
+    <p:sldId id="274" r:id="rId19"/>
+    <p:sldId id="275" r:id="rId20"/>
+    <p:sldId id="276" r:id="rId21"/>
   </p:sldIdLst>
   <p:sldSz cx="9144000" cy="6858000" type="screen4x3"/>
   <p:notesSz cx="6858000" cy="9144000"/>
@@ -107,6 +129,356 @@
 </p:presentation>
 </file>
 
+<file path=ppt/notesMasters/notesMaster1.xml><?xml version="1.0" encoding="utf-8"?>
+<p:notesMaster xmlns:a="http://schemas.openxmlformats.org/drawingml/2006/main" xmlns:r="http://schemas.openxmlformats.org/officeDocument/2006/relationships" xmlns:p="http://schemas.openxmlformats.org/presentationml/2006/main">
+  <p:cSld>
+    <p:bg>
+      <p:bgRef idx="1001">
+        <a:schemeClr val="bg1"/>
+      </p:bgRef>
+    </p:bg>
+    <p:spTree>
+      <p:nvGrpSpPr>
+        <p:cNvPr id="1" name=""/>
+        <p:cNvGrpSpPr/>
+        <p:nvPr/>
+      </p:nvGrpSpPr>
+      <p:grpSpPr>
+        <a:xfrm>
+          <a:off x="0" y="0"/>
+          <a:ext cx="0" cy="0"/>
+          <a:chOff x="0" y="0"/>
+          <a:chExt cx="0" cy="0"/>
+        </a:xfrm>
+      </p:grpSpPr>
+      <p:sp>
+        <p:nvSpPr>
+          <p:cNvPr id="2" name="Header Placeholder 1"/>
+          <p:cNvSpPr>
+            <a:spLocks noGrp="1"/>
+          </p:cNvSpPr>
+          <p:nvPr>
+            <p:ph type="hdr" sz="quarter"/>
+          </p:nvPr>
+        </p:nvSpPr>
+        <p:spPr>
+          <a:xfrm>
+            <a:off x="0" y="0"/>
+            <a:ext cx="2971800" cy="457200"/>
+          </a:xfrm>
+          <a:prstGeom prst="rect">
+            <a:avLst/>
+          </a:prstGeom>
+        </p:spPr>
+        <p:txBody>
+          <a:bodyPr vert="horz" lIns="91440" tIns="45720" rIns="91440" bIns="45720" rtlCol="0"/>
+          <a:lstStyle>
+            <a:lvl1pPr algn="l">
+              <a:defRPr sz="1200"/>
+            </a:lvl1pPr>
+          </a:lstStyle>
+          <a:p>
+            <a:endParaRPr lang="en-US"/>
+          </a:p>
+        </p:txBody>
+      </p:sp>
+      <p:sp>
+        <p:nvSpPr>
+          <p:cNvPr id="3" name="Date Placeholder 2"/>
+          <p:cNvSpPr>
+            <a:spLocks noGrp="1"/>
+          </p:cNvSpPr>
+          <p:nvPr>
+            <p:ph type="dt" idx="1"/>
+          </p:nvPr>
+        </p:nvSpPr>
+        <p:spPr>
+          <a:xfrm>
+            <a:off x="3884613" y="0"/>
+            <a:ext cx="2971800" cy="457200"/>
+          </a:xfrm>
+          <a:prstGeom prst="rect">
+            <a:avLst/>
+          </a:prstGeom>
+        </p:spPr>
+        <p:txBody>
+          <a:bodyPr vert="horz" lIns="91440" tIns="45720" rIns="91440" bIns="45720" rtlCol="0"/>
+          <a:lstStyle>
+            <a:lvl1pPr algn="r">
+              <a:defRPr sz="1200"/>
+            </a:lvl1pPr>
+          </a:lstStyle>
+          <a:p>
+            <a:fld id="{B95F3899-E7FD-4CE9-A021-D010FC201049}" type="datetimeFigureOut">
+              <a:rPr lang="en-US" smtClean="0"/>
+              <a:t>10/10/2023</a:t>
+            </a:fld>
+            <a:endParaRPr lang="en-US"/>
+          </a:p>
+        </p:txBody>
+      </p:sp>
+      <p:sp>
+        <p:nvSpPr>
+          <p:cNvPr id="4" name="Slide Image Placeholder 3"/>
+          <p:cNvSpPr>
+            <a:spLocks noGrp="1" noRot="1" noChangeAspect="1"/>
+          </p:cNvSpPr>
+          <p:nvPr>
+            <p:ph type="sldImg" idx="2"/>
+          </p:nvPr>
+        </p:nvSpPr>
+        <p:spPr>
+          <a:xfrm>
+            <a:off x="1143000" y="685800"/>
+            <a:ext cx="4572000" cy="3429000"/>
+          </a:xfrm>
+          <a:prstGeom prst="rect">
+            <a:avLst/>
+          </a:prstGeom>
+          <a:noFill/>
+          <a:ln w="12700">
+            <a:solidFill>
+              <a:prstClr val="black"/>
+            </a:solidFill>
+          </a:ln>
+        </p:spPr>
+        <p:txBody>
+          <a:bodyPr vert="horz" lIns="91440" tIns="45720" rIns="91440" bIns="45720" rtlCol="0" anchor="ctr"/>
+          <a:lstStyle/>
+          <a:p>
+            <a:endParaRPr lang="en-US"/>
+          </a:p>
+        </p:txBody>
+      </p:sp>
+      <p:sp>
+        <p:nvSpPr>
+          <p:cNvPr id="5" name="Notes Placeholder 4"/>
+          <p:cNvSpPr>
+            <a:spLocks noGrp="1"/>
+          </p:cNvSpPr>
+          <p:nvPr>
+            <p:ph type="body" sz="quarter" idx="3"/>
+          </p:nvPr>
+        </p:nvSpPr>
+        <p:spPr>
+          <a:xfrm>
+            <a:off x="685800" y="4343400"/>
+            <a:ext cx="5486400" cy="4114800"/>
+          </a:xfrm>
+          <a:prstGeom prst="rect">
+            <a:avLst/>
+          </a:prstGeom>
+        </p:spPr>
+        <p:txBody>
+          <a:bodyPr vert="horz" lIns="91440" tIns="45720" rIns="91440" bIns="45720" rtlCol="0"/>
+          <a:lstStyle/>
+          <a:p>
+            <a:pPr lvl="0"/>
+            <a:r>
+              <a:rPr lang="en-US" smtClean="0"/>
+              <a:t>Click to edit Master text styles</a:t>
+            </a:r>
+          </a:p>
+          <a:p>
+            <a:pPr lvl="1"/>
+            <a:r>
+              <a:rPr lang="en-US" smtClean="0"/>
+              <a:t>Second level</a:t>
+            </a:r>
+          </a:p>
+          <a:p>
+            <a:pPr lvl="2"/>
+            <a:r>
+              <a:rPr lang="en-US" smtClean="0"/>
+              <a:t>Third level</a:t>
+            </a:r>
+          </a:p>
+          <a:p>
+            <a:pPr lvl="3"/>
+            <a:r>
+              <a:rPr lang="en-US" smtClean="0"/>
+              <a:t>Fourth level</a:t>
+            </a:r>
+          </a:p>
+          <a:p>
+            <a:pPr lvl="4"/>
+            <a:r>
+              <a:rPr lang="en-US" smtClean="0"/>
+              <a:t>Fifth level</a:t>
+            </a:r>
+            <a:endParaRPr lang="en-US"/>
+          </a:p>
+        </p:txBody>
+      </p:sp>
+      <p:sp>
+        <p:nvSpPr>
+          <p:cNvPr id="6" name="Footer Placeholder 5"/>
+          <p:cNvSpPr>
+            <a:spLocks noGrp="1"/>
+          </p:cNvSpPr>
+          <p:nvPr>
+            <p:ph type="ftr" sz="quarter" idx="4"/>
+          </p:nvPr>
+        </p:nvSpPr>
+        <p:spPr>
+          <a:xfrm>
+            <a:off x="0" y="8685213"/>
+            <a:ext cx="2971800" cy="457200"/>
+          </a:xfrm>
+          <a:prstGeom prst="rect">
+            <a:avLst/>
+          </a:prstGeom>
+        </p:spPr>
+        <p:txBody>
+          <a:bodyPr vert="horz" lIns="91440" tIns="45720" rIns="91440" bIns="45720" rtlCol="0" anchor="b"/>
+          <a:lstStyle>
+            <a:lvl1pPr algn="l">
+              <a:defRPr sz="1200"/>
+            </a:lvl1pPr>
+          </a:lstStyle>
+          <a:p>
+            <a:endParaRPr lang="en-US"/>
+          </a:p>
+        </p:txBody>
+      </p:sp>
+      <p:sp>
+        <p:nvSpPr>
+          <p:cNvPr id="7" name="Slide Number Placeholder 6"/>
+          <p:cNvSpPr>
+            <a:spLocks noGrp="1"/>
+          </p:cNvSpPr>
+          <p:nvPr>
+            <p:ph type="sldNum" sz="quarter" idx="5"/>
+          </p:nvPr>
+        </p:nvSpPr>
+        <p:spPr>
+          <a:xfrm>
+            <a:off x="3884613" y="8685213"/>
+            <a:ext cx="2971800" cy="457200"/>
+          </a:xfrm>
+          <a:prstGeom prst="rect">
+            <a:avLst/>
+          </a:prstGeom>
+        </p:spPr>
+        <p:txBody>
+          <a:bodyPr vert="horz" lIns="91440" tIns="45720" rIns="91440" bIns="45720" rtlCol="0" anchor="b"/>
+          <a:lstStyle>
+            <a:lvl1pPr algn="r">
+              <a:defRPr sz="1200"/>
+            </a:lvl1pPr>
+          </a:lstStyle>
+          <a:p>
+            <a:fld id="{53C24173-A55D-48B4-8061-46BD49993B76}" type="slidenum">
+              <a:rPr lang="en-US" smtClean="0"/>
+              <a:t>‹#›</a:t>
+            </a:fld>
+            <a:endParaRPr lang="en-US"/>
+          </a:p>
+        </p:txBody>
+      </p:sp>
+    </p:spTree>
+    <p:extLst>
+      <p:ext uri="{BB962C8B-B14F-4D97-AF65-F5344CB8AC3E}">
+        <p14:creationId xmlns:p14="http://schemas.microsoft.com/office/powerpoint/2010/main" val="604647299"/>
+      </p:ext>
+    </p:extLst>
+  </p:cSld>
+  <p:clrMap bg1="lt1" tx1="dk1" bg2="lt2" tx2="dk2" accent1="accent1" accent2="accent2" accent3="accent3" accent4="accent4" accent5="accent5" accent6="accent6" hlink="hlink" folHlink="folHlink"/>
+  <p:notesStyle>
+    <a:lvl1pPr marL="0" algn="l" defTabSz="914400" rtl="0" eaLnBrk="1" latinLnBrk="0" hangingPunct="1">
+      <a:defRPr sz="1200" kern="1200">
+        <a:solidFill>
+          <a:schemeClr val="tx1"/>
+        </a:solidFill>
+        <a:latin typeface="+mn-lt"/>
+        <a:ea typeface="+mn-ea"/>
+        <a:cs typeface="+mn-cs"/>
+      </a:defRPr>
+    </a:lvl1pPr>
+    <a:lvl2pPr marL="457200" algn="l" defTabSz="914400" rtl="0" eaLnBrk="1" latinLnBrk="0" hangingPunct="1">
+      <a:defRPr sz="1200" kern="1200">
+        <a:solidFill>
+          <a:schemeClr val="tx1"/>
+        </a:solidFill>
+        <a:latin typeface="+mn-lt"/>
+        <a:ea typeface="+mn-ea"/>
+        <a:cs typeface="+mn-cs"/>
+      </a:defRPr>
+    </a:lvl2pPr>
+    <a:lvl3pPr marL="914400" algn="l" defTabSz="914400" rtl="0" eaLnBrk="1" latinLnBrk="0" hangingPunct="1">
+      <a:defRPr sz="1200" kern="1200">
+        <a:solidFill>
+          <a:schemeClr val="tx1"/>
+        </a:solidFill>
+        <a:latin typeface="+mn-lt"/>
+        <a:ea typeface="+mn-ea"/>
+        <a:cs typeface="+mn-cs"/>
+      </a:defRPr>
+    </a:lvl3pPr>
+    <a:lvl4pPr marL="1371600" algn="l" defTabSz="914400" rtl="0" eaLnBrk="1" latinLnBrk="0" hangingPunct="1">
+      <a:defRPr sz="1200" kern="1200">
+        <a:solidFill>
+          <a:schemeClr val="tx1"/>
+        </a:solidFill>
+        <a:latin typeface="+mn-lt"/>
+        <a:ea typeface="+mn-ea"/>
+        <a:cs typeface="+mn-cs"/>
+      </a:defRPr>
+    </a:lvl4pPr>
+    <a:lvl5pPr marL="1828800" algn="l" defTabSz="914400" rtl="0" eaLnBrk="1" latinLnBrk="0" hangingPunct="1">
+      <a:defRPr sz="1200" kern="1200">
+        <a:solidFill>
+          <a:schemeClr val="tx1"/>
+        </a:solidFill>
+        <a:latin typeface="+mn-lt"/>
+        <a:ea typeface="+mn-ea"/>
+        <a:cs typeface="+mn-cs"/>
+      </a:defRPr>
+    </a:lvl5pPr>
+    <a:lvl6pPr marL="2286000" algn="l" defTabSz="914400" rtl="0" eaLnBrk="1" latinLnBrk="0" hangingPunct="1">
+      <a:defRPr sz="1200" kern="1200">
+        <a:solidFill>
+          <a:schemeClr val="tx1"/>
+        </a:solidFill>
+        <a:latin typeface="+mn-lt"/>
+        <a:ea typeface="+mn-ea"/>
+        <a:cs typeface="+mn-cs"/>
+      </a:defRPr>
+    </a:lvl6pPr>
+    <a:lvl7pPr marL="2743200" algn="l" defTabSz="914400" rtl="0" eaLnBrk="1" latinLnBrk="0" hangingPunct="1">
+      <a:defRPr sz="1200" kern="1200">
+        <a:solidFill>
+          <a:schemeClr val="tx1"/>
+        </a:solidFill>
+        <a:latin typeface="+mn-lt"/>
+        <a:ea typeface="+mn-ea"/>
+        <a:cs typeface="+mn-cs"/>
+      </a:defRPr>
+    </a:lvl7pPr>
+    <a:lvl8pPr marL="3200400" algn="l" defTabSz="914400" rtl="0" eaLnBrk="1" latinLnBrk="0" hangingPunct="1">
+      <a:defRPr sz="1200" kern="1200">
+        <a:solidFill>
+          <a:schemeClr val="tx1"/>
+        </a:solidFill>
+        <a:latin typeface="+mn-lt"/>
+        <a:ea typeface="+mn-ea"/>
+        <a:cs typeface="+mn-cs"/>
+      </a:defRPr>
+    </a:lvl8pPr>
+    <a:lvl9pPr marL="3657600" algn="l" defTabSz="914400" rtl="0" eaLnBrk="1" latinLnBrk="0" hangingPunct="1">
+      <a:defRPr sz="1200" kern="1200">
+        <a:solidFill>
+          <a:schemeClr val="tx1"/>
+        </a:solidFill>
+        <a:latin typeface="+mn-lt"/>
+        <a:ea typeface="+mn-ea"/>
+        <a:cs typeface="+mn-cs"/>
+      </a:defRPr>
+    </a:lvl9pPr>
+  </p:notesStyle>
+</p:notesMaster>
+</file>
+
 <file path=ppt/slideLayouts/slideLayout1.xml><?xml version="1.0" encoding="utf-8"?>
 <p:sldLayout xmlns:a="http://schemas.openxmlformats.org/drawingml/2006/main" xmlns:r="http://schemas.openxmlformats.org/officeDocument/2006/relationships" xmlns:p="http://schemas.openxmlformats.org/presentationml/2006/main" type="title" preserve="1">
   <p:cSld name="Title Slide">
@@ -288,7 +660,7 @@
           <a:p>
             <a:fld id="{02552700-D2E5-4D4F-A1E6-8D44861F8D03}" type="datetimeFigureOut">
               <a:rPr lang="en-US" smtClean="0"/>
-              <a:t>10/9/2023</a:t>
+              <a:t>10/10/2023</a:t>
             </a:fld>
             <a:endParaRPr lang="en-US"/>
           </a:p>
@@ -458,7 +830,7 @@
           <a:p>
             <a:fld id="{02552700-D2E5-4D4F-A1E6-8D44861F8D03}" type="datetimeFigureOut">
               <a:rPr lang="en-US" smtClean="0"/>
-              <a:t>10/9/2023</a:t>
+              <a:t>10/10/2023</a:t>
             </a:fld>
             <a:endParaRPr lang="en-US"/>
           </a:p>
@@ -638,7 +1010,7 @@
           <a:p>
             <a:fld id="{02552700-D2E5-4D4F-A1E6-8D44861F8D03}" type="datetimeFigureOut">
               <a:rPr lang="en-US" smtClean="0"/>
-              <a:t>10/9/2023</a:t>
+              <a:t>10/10/2023</a:t>
             </a:fld>
             <a:endParaRPr lang="en-US"/>
           </a:p>
@@ -808,7 +1180,7 @@
           <a:p>
             <a:fld id="{02552700-D2E5-4D4F-A1E6-8D44861F8D03}" type="datetimeFigureOut">
               <a:rPr lang="en-US" smtClean="0"/>
-              <a:t>10/9/2023</a:t>
+              <a:t>10/10/2023</a:t>
             </a:fld>
             <a:endParaRPr lang="en-US"/>
           </a:p>
@@ -1054,7 +1426,7 @@
           <a:p>
             <a:fld id="{02552700-D2E5-4D4F-A1E6-8D44861F8D03}" type="datetimeFigureOut">
               <a:rPr lang="en-US" smtClean="0"/>
-              <a:t>10/9/2023</a:t>
+              <a:t>10/10/2023</a:t>
             </a:fld>
             <a:endParaRPr lang="en-US"/>
           </a:p>
@@ -1342,7 +1714,7 @@
           <a:p>
             <a:fld id="{02552700-D2E5-4D4F-A1E6-8D44861F8D03}" type="datetimeFigureOut">
               <a:rPr lang="en-US" smtClean="0"/>
-              <a:t>10/9/2023</a:t>
+              <a:t>10/10/2023</a:t>
             </a:fld>
             <a:endParaRPr lang="en-US"/>
           </a:p>
@@ -1764,7 +2136,7 @@
           <a:p>
             <a:fld id="{02552700-D2E5-4D4F-A1E6-8D44861F8D03}" type="datetimeFigureOut">
               <a:rPr lang="en-US" smtClean="0"/>
-              <a:t>10/9/2023</a:t>
+              <a:t>10/10/2023</a:t>
             </a:fld>
             <a:endParaRPr lang="en-US"/>
           </a:p>
@@ -1882,7 +2254,7 @@
           <a:p>
             <a:fld id="{02552700-D2E5-4D4F-A1E6-8D44861F8D03}" type="datetimeFigureOut">
               <a:rPr lang="en-US" smtClean="0"/>
-              <a:t>10/9/2023</a:t>
+              <a:t>10/10/2023</a:t>
             </a:fld>
             <a:endParaRPr lang="en-US"/>
           </a:p>
@@ -1977,7 +2349,7 @@
           <a:p>
             <a:fld id="{02552700-D2E5-4D4F-A1E6-8D44861F8D03}" type="datetimeFigureOut">
               <a:rPr lang="en-US" smtClean="0"/>
-              <a:t>10/9/2023</a:t>
+              <a:t>10/10/2023</a:t>
             </a:fld>
             <a:endParaRPr lang="en-US"/>
           </a:p>
@@ -2254,7 +2626,7 @@
           <a:p>
             <a:fld id="{02552700-D2E5-4D4F-A1E6-8D44861F8D03}" type="datetimeFigureOut">
               <a:rPr lang="en-US" smtClean="0"/>
-              <a:t>10/9/2023</a:t>
+              <a:t>10/10/2023</a:t>
             </a:fld>
             <a:endParaRPr lang="en-US"/>
           </a:p>
@@ -2507,7 +2879,7 @@
           <a:p>
             <a:fld id="{02552700-D2E5-4D4F-A1E6-8D44861F8D03}" type="datetimeFigureOut">
               <a:rPr lang="en-US" smtClean="0"/>
-              <a:t>10/9/2023</a:t>
+              <a:t>10/10/2023</a:t>
             </a:fld>
             <a:endParaRPr lang="en-US"/>
           </a:p>
@@ -2720,7 +3092,7 @@
           <a:p>
             <a:fld id="{02552700-D2E5-4D4F-A1E6-8D44861F8D03}" type="datetimeFigureOut">
               <a:rPr lang="en-US" smtClean="0"/>
-              <a:t>10/9/2023</a:t>
+              <a:t>10/10/2023</a:t>
             </a:fld>
             <a:endParaRPr lang="en-US"/>
           </a:p>
@@ -3121,25 +3493,6 @@
           </a:p>
         </p:txBody>
       </p:sp>
-      <p:sp>
-        <p:nvSpPr>
-          <p:cNvPr id="3" name="Subtitle 2"/>
-          <p:cNvSpPr>
-            <a:spLocks noGrp="1"/>
-          </p:cNvSpPr>
-          <p:nvPr>
-            <p:ph type="subTitle" idx="1"/>
-          </p:nvPr>
-        </p:nvSpPr>
-        <p:spPr/>
-        <p:txBody>
-          <a:bodyPr/>
-          <a:lstStyle/>
-          <a:p>
-            <a:endParaRPr lang="en-US"/>
-          </a:p>
-        </p:txBody>
-      </p:sp>
     </p:spTree>
     <p:extLst>
       <p:ext uri="{BB962C8B-B14F-4D97-AF65-F5344CB8AC3E}">
@@ -3150,6 +3503,2915 @@
   <p:clrMapOvr>
     <a:masterClrMapping/>
   </p:clrMapOvr>
+  <p:timing>
+    <p:tnLst>
+      <p:par>
+        <p:cTn id="1" dur="indefinite" restart="never" nodeType="tmRoot"/>
+      </p:par>
+    </p:tnLst>
+  </p:timing>
+</p:sld>
+</file>
+
+<file path=ppt/slides/slide10.xml><?xml version="1.0" encoding="utf-8"?>
+<p:sld xmlns:a="http://schemas.openxmlformats.org/drawingml/2006/main" xmlns:r="http://schemas.openxmlformats.org/officeDocument/2006/relationships" xmlns:p="http://schemas.openxmlformats.org/presentationml/2006/main">
+  <p:cSld>
+    <p:spTree>
+      <p:nvGrpSpPr>
+        <p:cNvPr id="1" name=""/>
+        <p:cNvGrpSpPr/>
+        <p:nvPr/>
+      </p:nvGrpSpPr>
+      <p:grpSpPr>
+        <a:xfrm>
+          <a:off x="0" y="0"/>
+          <a:ext cx="0" cy="0"/>
+          <a:chOff x="0" y="0"/>
+          <a:chExt cx="0" cy="0"/>
+        </a:xfrm>
+      </p:grpSpPr>
+      <p:sp>
+        <p:nvSpPr>
+          <p:cNvPr id="2" name="Title 1"/>
+          <p:cNvSpPr>
+            <a:spLocks noGrp="1"/>
+          </p:cNvSpPr>
+          <p:nvPr>
+            <p:ph type="title"/>
+          </p:nvPr>
+        </p:nvSpPr>
+        <p:spPr>
+          <a:xfrm>
+            <a:off x="457200" y="152400"/>
+            <a:ext cx="8382000" cy="838200"/>
+          </a:xfrm>
+        </p:spPr>
+        <p:txBody>
+          <a:bodyPr>
+            <a:noAutofit/>
+          </a:bodyPr>
+          <a:lstStyle/>
+          <a:p>
+            <a:r>
+              <a:rPr lang="en-US" sz="3600" dirty="0" smtClean="0"/>
+              <a:t>Segmented Analysis</a:t>
+            </a:r>
+            <a:r>
+              <a:rPr lang="en-US" sz="3600" dirty="0" smtClean="0"/>
+              <a:t/>
+            </a:r>
+            <a:br>
+              <a:rPr lang="en-US" sz="3600" dirty="0" smtClean="0"/>
+            </a:br>
+            <a:r>
+              <a:rPr lang="en-US" sz="3600" dirty="0" smtClean="0"/>
+              <a:t>(Extreme Good grade A1  to </a:t>
+            </a:r>
+            <a:r>
+              <a:rPr lang="en-US" sz="3600" dirty="0" smtClean="0"/>
+              <a:t>Worst Case G3</a:t>
+            </a:r>
+            <a:r>
+              <a:rPr lang="en-US" sz="3600" dirty="0" smtClean="0"/>
+              <a:t>)</a:t>
+            </a:r>
+            <a:endParaRPr lang="en-US" sz="3600" dirty="0"/>
+          </a:p>
+        </p:txBody>
+      </p:sp>
+      <p:pic>
+        <p:nvPicPr>
+          <p:cNvPr id="5122" name="Picture 2"/>
+          <p:cNvPicPr>
+            <a:picLocks noGrp="1" noChangeAspect="1" noChangeArrowheads="1"/>
+          </p:cNvPicPr>
+          <p:nvPr>
+            <p:ph sz="half" idx="1"/>
+          </p:nvPr>
+        </p:nvPicPr>
+        <p:blipFill>
+          <a:blip r:embed="rId2">
+            <a:extLst>
+              <a:ext uri="{28A0092B-C50C-407E-A947-70E740481C1C}">
+                <a14:useLocalDpi xmlns:a14="http://schemas.microsoft.com/office/drawing/2010/main" val="0"/>
+              </a:ext>
+            </a:extLst>
+          </a:blip>
+          <a:srcRect/>
+          <a:stretch>
+            <a:fillRect/>
+          </a:stretch>
+        </p:blipFill>
+        <p:spPr bwMode="auto">
+          <a:xfrm>
+            <a:off x="304800" y="1066800"/>
+            <a:ext cx="8534400" cy="5791200"/>
+          </a:xfrm>
+          <a:prstGeom prst="rect">
+            <a:avLst/>
+          </a:prstGeom>
+          <a:noFill/>
+          <a:ln>
+            <a:noFill/>
+          </a:ln>
+          <a:extLst>
+            <a:ext uri="{909E8E84-426E-40DD-AFC4-6F175D3DCCD1}">
+              <a14:hiddenFill xmlns:a14="http://schemas.microsoft.com/office/drawing/2010/main">
+                <a:solidFill>
+                  <a:schemeClr val="accent1"/>
+                </a:solidFill>
+              </a14:hiddenFill>
+            </a:ext>
+            <a:ext uri="{91240B29-F687-4F45-9708-019B960494DF}">
+              <a14:hiddenLine xmlns:a14="http://schemas.microsoft.com/office/drawing/2010/main" w="9525">
+                <a:solidFill>
+                  <a:schemeClr val="tx1"/>
+                </a:solidFill>
+                <a:miter lim="800000"/>
+                <a:headEnd/>
+                <a:tailEnd/>
+              </a14:hiddenLine>
+            </a:ext>
+          </a:extLst>
+        </p:spPr>
+      </p:pic>
+    </p:spTree>
+    <p:extLst>
+      <p:ext uri="{BB962C8B-B14F-4D97-AF65-F5344CB8AC3E}">
+        <p14:creationId xmlns:p14="http://schemas.microsoft.com/office/powerpoint/2010/main" val="808769254"/>
+      </p:ext>
+    </p:extLst>
+  </p:cSld>
+  <p:clrMapOvr>
+    <a:masterClrMapping/>
+  </p:clrMapOvr>
+  <p:timing>
+    <p:tnLst>
+      <p:par>
+        <p:cTn id="1" dur="indefinite" restart="never" nodeType="tmRoot"/>
+      </p:par>
+    </p:tnLst>
+  </p:timing>
+</p:sld>
+</file>
+
+<file path=ppt/slides/slide11.xml><?xml version="1.0" encoding="utf-8"?>
+<p:sld xmlns:a="http://schemas.openxmlformats.org/drawingml/2006/main" xmlns:r="http://schemas.openxmlformats.org/officeDocument/2006/relationships" xmlns:p="http://schemas.openxmlformats.org/presentationml/2006/main">
+  <p:cSld>
+    <p:spTree>
+      <p:nvGrpSpPr>
+        <p:cNvPr id="1" name=""/>
+        <p:cNvGrpSpPr/>
+        <p:nvPr/>
+      </p:nvGrpSpPr>
+      <p:grpSpPr>
+        <a:xfrm>
+          <a:off x="0" y="0"/>
+          <a:ext cx="0" cy="0"/>
+          <a:chOff x="0" y="0"/>
+          <a:chExt cx="0" cy="0"/>
+        </a:xfrm>
+      </p:grpSpPr>
+      <p:sp>
+        <p:nvSpPr>
+          <p:cNvPr id="2" name="Title 1"/>
+          <p:cNvSpPr>
+            <a:spLocks noGrp="1"/>
+          </p:cNvSpPr>
+          <p:nvPr>
+            <p:ph type="title"/>
+          </p:nvPr>
+        </p:nvSpPr>
+        <p:spPr/>
+        <p:txBody>
+          <a:bodyPr/>
+          <a:lstStyle/>
+          <a:p>
+            <a:r>
+              <a:rPr lang="en-US" dirty="0" smtClean="0"/>
+              <a:t>Observation</a:t>
+            </a:r>
+            <a:endParaRPr lang="en-US" dirty="0"/>
+          </a:p>
+        </p:txBody>
+      </p:sp>
+      <p:sp>
+        <p:nvSpPr>
+          <p:cNvPr id="4" name="Content Placeholder 3"/>
+          <p:cNvSpPr>
+            <a:spLocks noGrp="1"/>
+          </p:cNvSpPr>
+          <p:nvPr>
+            <p:ph sz="half" idx="2"/>
+          </p:nvPr>
+        </p:nvSpPr>
+        <p:spPr>
+          <a:xfrm>
+            <a:off x="4648200" y="1600200"/>
+            <a:ext cx="4038600" cy="4525963"/>
+          </a:xfrm>
+        </p:spPr>
+        <p:txBody>
+          <a:bodyPr>
+            <a:normAutofit fontScale="55000" lnSpcReduction="20000"/>
+          </a:bodyPr>
+          <a:lstStyle/>
+          <a:p>
+            <a:r>
+              <a:rPr lang="en-US" dirty="0"/>
+              <a:t>| Worst Case G3 | Good Case A1 |</a:t>
+            </a:r>
+          </a:p>
+          <a:p>
+            <a:r>
+              <a:rPr lang="en-US" dirty="0"/>
+              <a:t>| :- | :-: |</a:t>
+            </a:r>
+          </a:p>
+          <a:p>
+            <a:r>
+              <a:rPr lang="en-US" dirty="0"/>
+              <a:t>| Loan Amount is 16645 | Loan amount is 7262 |</a:t>
+            </a:r>
+          </a:p>
+          <a:p>
+            <a:r>
+              <a:rPr lang="en-US" dirty="0"/>
+              <a:t>| Terms is 60 months |  Terms is 36 months |</a:t>
+            </a:r>
+          </a:p>
+          <a:p>
+            <a:r>
+              <a:rPr lang="en-US" dirty="0"/>
+              <a:t>| Rate of Interest is 20% | Rate of Interest is 5% |</a:t>
+            </a:r>
+          </a:p>
+          <a:p>
+            <a:r>
+              <a:rPr lang="en-US" dirty="0"/>
+              <a:t>| Employee Length is 5 | Employee Length is 5 | </a:t>
+            </a:r>
+          </a:p>
+          <a:p>
+            <a:r>
+              <a:rPr lang="en-US" dirty="0"/>
+              <a:t>| DTI is 15 | DTI is 10 |</a:t>
+            </a:r>
+          </a:p>
+          <a:p>
+            <a:r>
+              <a:rPr lang="en-US" dirty="0"/>
+              <a:t>| </a:t>
+            </a:r>
+            <a:r>
+              <a:rPr lang="en-US" dirty="0" err="1"/>
+              <a:t>No_open_credit_lines</a:t>
+            </a:r>
+            <a:r>
+              <a:rPr lang="en-US" dirty="0"/>
+              <a:t> is 10 | </a:t>
+            </a:r>
+            <a:r>
+              <a:rPr lang="en-US" dirty="0" err="1"/>
+              <a:t>No_open_credit_lines</a:t>
+            </a:r>
+            <a:r>
+              <a:rPr lang="en-US" dirty="0"/>
+              <a:t> is 9 |</a:t>
+            </a:r>
+          </a:p>
+          <a:p>
+            <a:r>
+              <a:rPr lang="en-US" dirty="0"/>
+              <a:t>| </a:t>
+            </a:r>
+            <a:r>
+              <a:rPr lang="en-US" dirty="0" err="1"/>
+              <a:t>Revolving_credit_bal</a:t>
+            </a:r>
+            <a:r>
+              <a:rPr lang="en-US" dirty="0"/>
+              <a:t> is 11571.750000	 | </a:t>
+            </a:r>
+            <a:r>
+              <a:rPr lang="en-US" dirty="0" err="1"/>
+              <a:t>Revolving_credit_bal</a:t>
+            </a:r>
+            <a:r>
+              <a:rPr lang="en-US" dirty="0"/>
+              <a:t> is 9924.383228 | </a:t>
+            </a:r>
+          </a:p>
+          <a:p>
+            <a:r>
+              <a:rPr lang="en-US" dirty="0"/>
+              <a:t>| </a:t>
+            </a:r>
+            <a:r>
+              <a:rPr lang="en-US" dirty="0" err="1"/>
+              <a:t>Total_no_credit_lines</a:t>
+            </a:r>
+            <a:r>
+              <a:rPr lang="en-US" dirty="0"/>
+              <a:t> is 23 | </a:t>
+            </a:r>
+            <a:r>
+              <a:rPr lang="en-US" dirty="0" err="1"/>
+              <a:t>Total_no_credit_lines</a:t>
+            </a:r>
+            <a:r>
+              <a:rPr lang="en-US" dirty="0"/>
+              <a:t> is 25 |</a:t>
+            </a:r>
+          </a:p>
+          <a:p>
+            <a:endParaRPr lang="en-US" dirty="0"/>
+          </a:p>
+          <a:p>
+            <a:endParaRPr lang="en-US" dirty="0"/>
+          </a:p>
+          <a:p>
+            <a:r>
+              <a:rPr lang="en-US" dirty="0"/>
+              <a:t>#### Observation :- All the important factors are almost half in Ratio</a:t>
+            </a:r>
+          </a:p>
+        </p:txBody>
+      </p:sp>
+      <p:pic>
+        <p:nvPicPr>
+          <p:cNvPr id="1027" name="Picture 3"/>
+          <p:cNvPicPr>
+            <a:picLocks noGrp="1" noChangeAspect="1" noChangeArrowheads="1"/>
+          </p:cNvPicPr>
+          <p:nvPr>
+            <p:ph sz="half" idx="1"/>
+          </p:nvPr>
+        </p:nvPicPr>
+        <p:blipFill>
+          <a:blip r:embed="rId2">
+            <a:extLst>
+              <a:ext uri="{28A0092B-C50C-407E-A947-70E740481C1C}">
+                <a14:useLocalDpi xmlns:a14="http://schemas.microsoft.com/office/drawing/2010/main" val="0"/>
+              </a:ext>
+            </a:extLst>
+          </a:blip>
+          <a:srcRect/>
+          <a:stretch>
+            <a:fillRect/>
+          </a:stretch>
+        </p:blipFill>
+        <p:spPr bwMode="auto">
+          <a:xfrm>
+            <a:off x="457200" y="1066800"/>
+            <a:ext cx="8610600" cy="5638800"/>
+          </a:xfrm>
+          <a:prstGeom prst="rect">
+            <a:avLst/>
+          </a:prstGeom>
+          <a:noFill/>
+          <a:ln>
+            <a:noFill/>
+          </a:ln>
+          <a:extLst>
+            <a:ext uri="{909E8E84-426E-40DD-AFC4-6F175D3DCCD1}">
+              <a14:hiddenFill xmlns:a14="http://schemas.microsoft.com/office/drawing/2010/main">
+                <a:solidFill>
+                  <a:schemeClr val="accent1"/>
+                </a:solidFill>
+              </a14:hiddenFill>
+            </a:ext>
+            <a:ext uri="{91240B29-F687-4F45-9708-019B960494DF}">
+              <a14:hiddenLine xmlns:a14="http://schemas.microsoft.com/office/drawing/2010/main" w="9525">
+                <a:solidFill>
+                  <a:schemeClr val="tx1"/>
+                </a:solidFill>
+                <a:miter lim="800000"/>
+                <a:headEnd/>
+                <a:tailEnd/>
+              </a14:hiddenLine>
+            </a:ext>
+          </a:extLst>
+        </p:spPr>
+      </p:pic>
+    </p:spTree>
+    <p:extLst>
+      <p:ext uri="{BB962C8B-B14F-4D97-AF65-F5344CB8AC3E}">
+        <p14:creationId xmlns:p14="http://schemas.microsoft.com/office/powerpoint/2010/main" val="3292471790"/>
+      </p:ext>
+    </p:extLst>
+  </p:cSld>
+  <p:clrMapOvr>
+    <a:masterClrMapping/>
+  </p:clrMapOvr>
+  <p:timing>
+    <p:tnLst>
+      <p:par>
+        <p:cTn id="1" dur="indefinite" restart="never" nodeType="tmRoot"/>
+      </p:par>
+    </p:tnLst>
+  </p:timing>
+</p:sld>
+</file>
+
+<file path=ppt/slides/slide12.xml><?xml version="1.0" encoding="utf-8"?>
+<p:sld xmlns:a="http://schemas.openxmlformats.org/drawingml/2006/main" xmlns:r="http://schemas.openxmlformats.org/officeDocument/2006/relationships" xmlns:p="http://schemas.openxmlformats.org/presentationml/2006/main">
+  <p:cSld>
+    <p:spTree>
+      <p:nvGrpSpPr>
+        <p:cNvPr id="1" name=""/>
+        <p:cNvGrpSpPr/>
+        <p:nvPr/>
+      </p:nvGrpSpPr>
+      <p:grpSpPr>
+        <a:xfrm>
+          <a:off x="0" y="0"/>
+          <a:ext cx="0" cy="0"/>
+          <a:chOff x="0" y="0"/>
+          <a:chExt cx="0" cy="0"/>
+        </a:xfrm>
+      </p:grpSpPr>
+      <p:sp>
+        <p:nvSpPr>
+          <p:cNvPr id="6" name="Title 5"/>
+          <p:cNvSpPr>
+            <a:spLocks noGrp="1"/>
+          </p:cNvSpPr>
+          <p:nvPr>
+            <p:ph type="title"/>
+          </p:nvPr>
+        </p:nvSpPr>
+        <p:spPr/>
+        <p:txBody>
+          <a:bodyPr>
+            <a:normAutofit/>
+          </a:bodyPr>
+          <a:lstStyle/>
+          <a:p>
+            <a:r>
+              <a:rPr lang="en-US" sz="3600" dirty="0"/>
+              <a:t>Segmentation</a:t>
+            </a:r>
+            <a:r>
+              <a:rPr lang="en-US" sz="3200" dirty="0"/>
+              <a:t/>
+            </a:r>
+            <a:br>
+              <a:rPr lang="en-US" sz="3200" dirty="0"/>
+            </a:br>
+            <a:r>
+              <a:rPr lang="en-US" sz="3200" dirty="0" smtClean="0"/>
+              <a:t>(Good </a:t>
+            </a:r>
+            <a:r>
+              <a:rPr lang="en-US" sz="3200" dirty="0"/>
+              <a:t>grade </a:t>
+            </a:r>
+            <a:r>
+              <a:rPr lang="en-US" sz="3200" dirty="0" smtClean="0"/>
+              <a:t>A1 (FP) -  </a:t>
+            </a:r>
+            <a:r>
+              <a:rPr lang="en-US" sz="3200" dirty="0"/>
+              <a:t>to </a:t>
+            </a:r>
+            <a:r>
+              <a:rPr lang="en-US" sz="3200" dirty="0" smtClean="0"/>
+              <a:t>Bad Case B5 (CO))</a:t>
+            </a:r>
+            <a:endParaRPr lang="en-US" sz="3200" dirty="0"/>
+          </a:p>
+        </p:txBody>
+      </p:sp>
+      <p:pic>
+        <p:nvPicPr>
+          <p:cNvPr id="6146" name="Picture 2"/>
+          <p:cNvPicPr>
+            <a:picLocks noGrp="1" noChangeAspect="1" noChangeArrowheads="1"/>
+          </p:cNvPicPr>
+          <p:nvPr>
+            <p:ph idx="1"/>
+          </p:nvPr>
+        </p:nvPicPr>
+        <p:blipFill>
+          <a:blip r:embed="rId2">
+            <a:extLst>
+              <a:ext uri="{28A0092B-C50C-407E-A947-70E740481C1C}">
+                <a14:useLocalDpi xmlns:a14="http://schemas.microsoft.com/office/drawing/2010/main" val="0"/>
+              </a:ext>
+            </a:extLst>
+          </a:blip>
+          <a:srcRect/>
+          <a:stretch>
+            <a:fillRect/>
+          </a:stretch>
+        </p:blipFill>
+        <p:spPr bwMode="auto">
+          <a:xfrm>
+            <a:off x="457200" y="1524000"/>
+            <a:ext cx="8229600" cy="5105400"/>
+          </a:xfrm>
+          <a:prstGeom prst="rect">
+            <a:avLst/>
+          </a:prstGeom>
+          <a:noFill/>
+          <a:ln>
+            <a:noFill/>
+          </a:ln>
+          <a:extLst>
+            <a:ext uri="{909E8E84-426E-40DD-AFC4-6F175D3DCCD1}">
+              <a14:hiddenFill xmlns:a14="http://schemas.microsoft.com/office/drawing/2010/main">
+                <a:solidFill>
+                  <a:schemeClr val="accent1"/>
+                </a:solidFill>
+              </a14:hiddenFill>
+            </a:ext>
+            <a:ext uri="{91240B29-F687-4F45-9708-019B960494DF}">
+              <a14:hiddenLine xmlns:a14="http://schemas.microsoft.com/office/drawing/2010/main" w="9525">
+                <a:solidFill>
+                  <a:schemeClr val="tx1"/>
+                </a:solidFill>
+                <a:miter lim="800000"/>
+                <a:headEnd/>
+                <a:tailEnd/>
+              </a14:hiddenLine>
+            </a:ext>
+          </a:extLst>
+        </p:spPr>
+      </p:pic>
+    </p:spTree>
+    <p:extLst>
+      <p:ext uri="{BB962C8B-B14F-4D97-AF65-F5344CB8AC3E}">
+        <p14:creationId xmlns:p14="http://schemas.microsoft.com/office/powerpoint/2010/main" val="1211005009"/>
+      </p:ext>
+    </p:extLst>
+  </p:cSld>
+  <p:clrMapOvr>
+    <a:masterClrMapping/>
+  </p:clrMapOvr>
+  <p:timing>
+    <p:tnLst>
+      <p:par>
+        <p:cTn id="1" dur="indefinite" restart="never" nodeType="tmRoot"/>
+      </p:par>
+    </p:tnLst>
+  </p:timing>
+</p:sld>
+</file>
+
+<file path=ppt/slides/slide13.xml><?xml version="1.0" encoding="utf-8"?>
+<p:sld xmlns:a="http://schemas.openxmlformats.org/drawingml/2006/main" xmlns:r="http://schemas.openxmlformats.org/officeDocument/2006/relationships" xmlns:p="http://schemas.openxmlformats.org/presentationml/2006/main">
+  <p:cSld>
+    <p:spTree>
+      <p:nvGrpSpPr>
+        <p:cNvPr id="1" name=""/>
+        <p:cNvGrpSpPr/>
+        <p:nvPr/>
+      </p:nvGrpSpPr>
+      <p:grpSpPr>
+        <a:xfrm>
+          <a:off x="0" y="0"/>
+          <a:ext cx="0" cy="0"/>
+          <a:chOff x="0" y="0"/>
+          <a:chExt cx="0" cy="0"/>
+        </a:xfrm>
+      </p:grpSpPr>
+      <p:sp>
+        <p:nvSpPr>
+          <p:cNvPr id="2" name="Title 1"/>
+          <p:cNvSpPr>
+            <a:spLocks noGrp="1"/>
+          </p:cNvSpPr>
+          <p:nvPr>
+            <p:ph type="title"/>
+          </p:nvPr>
+        </p:nvSpPr>
+        <p:spPr/>
+        <p:txBody>
+          <a:bodyPr>
+            <a:normAutofit/>
+          </a:bodyPr>
+          <a:lstStyle/>
+          <a:p>
+            <a:r>
+              <a:rPr lang="en-US" sz="3600" dirty="0" smtClean="0"/>
+              <a:t>Observation</a:t>
+            </a:r>
+            <a:endParaRPr lang="en-US" sz="3600" dirty="0"/>
+          </a:p>
+        </p:txBody>
+      </p:sp>
+      <p:sp>
+        <p:nvSpPr>
+          <p:cNvPr id="4" name="Content Placeholder 3"/>
+          <p:cNvSpPr>
+            <a:spLocks noGrp="1"/>
+          </p:cNvSpPr>
+          <p:nvPr>
+            <p:ph idx="1"/>
+          </p:nvPr>
+        </p:nvSpPr>
+        <p:spPr/>
+        <p:txBody>
+          <a:bodyPr/>
+          <a:lstStyle/>
+          <a:p>
+            <a:endParaRPr lang="en-US"/>
+          </a:p>
+        </p:txBody>
+      </p:sp>
+      <p:pic>
+        <p:nvPicPr>
+          <p:cNvPr id="2051" name="Picture 3"/>
+          <p:cNvPicPr>
+            <a:picLocks noChangeAspect="1" noChangeArrowheads="1"/>
+          </p:cNvPicPr>
+          <p:nvPr/>
+        </p:nvPicPr>
+        <p:blipFill>
+          <a:blip r:embed="rId2">
+            <a:extLst>
+              <a:ext uri="{28A0092B-C50C-407E-A947-70E740481C1C}">
+                <a14:useLocalDpi xmlns:a14="http://schemas.microsoft.com/office/drawing/2010/main" val="0"/>
+              </a:ext>
+            </a:extLst>
+          </a:blip>
+          <a:srcRect/>
+          <a:stretch>
+            <a:fillRect/>
+          </a:stretch>
+        </p:blipFill>
+        <p:spPr bwMode="auto">
+          <a:xfrm>
+            <a:off x="381001" y="1219200"/>
+            <a:ext cx="8305800" cy="5334000"/>
+          </a:xfrm>
+          <a:prstGeom prst="rect">
+            <a:avLst/>
+          </a:prstGeom>
+          <a:noFill/>
+          <a:ln>
+            <a:noFill/>
+          </a:ln>
+          <a:extLst>
+            <a:ext uri="{909E8E84-426E-40DD-AFC4-6F175D3DCCD1}">
+              <a14:hiddenFill xmlns:a14="http://schemas.microsoft.com/office/drawing/2010/main">
+                <a:solidFill>
+                  <a:schemeClr val="accent1"/>
+                </a:solidFill>
+              </a14:hiddenFill>
+            </a:ext>
+            <a:ext uri="{91240B29-F687-4F45-9708-019B960494DF}">
+              <a14:hiddenLine xmlns:a14="http://schemas.microsoft.com/office/drawing/2010/main" w="9525">
+                <a:solidFill>
+                  <a:schemeClr val="tx1"/>
+                </a:solidFill>
+                <a:miter lim="800000"/>
+                <a:headEnd/>
+                <a:tailEnd/>
+              </a14:hiddenLine>
+            </a:ext>
+          </a:extLst>
+        </p:spPr>
+      </p:pic>
+    </p:spTree>
+    <p:extLst>
+      <p:ext uri="{BB962C8B-B14F-4D97-AF65-F5344CB8AC3E}">
+        <p14:creationId xmlns:p14="http://schemas.microsoft.com/office/powerpoint/2010/main" val="3143279224"/>
+      </p:ext>
+    </p:extLst>
+  </p:cSld>
+  <p:clrMapOvr>
+    <a:masterClrMapping/>
+  </p:clrMapOvr>
+  <p:timing>
+    <p:tnLst>
+      <p:par>
+        <p:cTn id="1" dur="indefinite" restart="never" nodeType="tmRoot"/>
+      </p:par>
+    </p:tnLst>
+  </p:timing>
+</p:sld>
+</file>
+
+<file path=ppt/slides/slide14.xml><?xml version="1.0" encoding="utf-8"?>
+<p:sld xmlns:a="http://schemas.openxmlformats.org/drawingml/2006/main" xmlns:r="http://schemas.openxmlformats.org/officeDocument/2006/relationships" xmlns:p="http://schemas.openxmlformats.org/presentationml/2006/main">
+  <p:cSld>
+    <p:spTree>
+      <p:nvGrpSpPr>
+        <p:cNvPr id="1" name=""/>
+        <p:cNvGrpSpPr/>
+        <p:nvPr/>
+      </p:nvGrpSpPr>
+      <p:grpSpPr>
+        <a:xfrm>
+          <a:off x="0" y="0"/>
+          <a:ext cx="0" cy="0"/>
+          <a:chOff x="0" y="0"/>
+          <a:chExt cx="0" cy="0"/>
+        </a:xfrm>
+      </p:grpSpPr>
+      <p:sp>
+        <p:nvSpPr>
+          <p:cNvPr id="2" name="Title 1"/>
+          <p:cNvSpPr>
+            <a:spLocks noGrp="1"/>
+          </p:cNvSpPr>
+          <p:nvPr>
+            <p:ph type="title"/>
+          </p:nvPr>
+        </p:nvSpPr>
+        <p:spPr/>
+        <p:txBody>
+          <a:bodyPr>
+            <a:normAutofit/>
+          </a:bodyPr>
+          <a:lstStyle/>
+          <a:p>
+            <a:r>
+              <a:rPr lang="en-US" sz="3600" dirty="0" smtClean="0"/>
+              <a:t>Grade B (FP) to B (CO)</a:t>
+            </a:r>
+            <a:endParaRPr lang="en-US" sz="3600" dirty="0"/>
+          </a:p>
+        </p:txBody>
+      </p:sp>
+      <p:sp>
+        <p:nvSpPr>
+          <p:cNvPr id="4" name="Content Placeholder 3"/>
+          <p:cNvSpPr>
+            <a:spLocks noGrp="1"/>
+          </p:cNvSpPr>
+          <p:nvPr>
+            <p:ph idx="1"/>
+          </p:nvPr>
+        </p:nvSpPr>
+        <p:spPr/>
+        <p:txBody>
+          <a:bodyPr/>
+          <a:lstStyle/>
+          <a:p>
+            <a:endParaRPr lang="en-US"/>
+          </a:p>
+        </p:txBody>
+      </p:sp>
+      <p:pic>
+        <p:nvPicPr>
+          <p:cNvPr id="4099" name="Picture 3"/>
+          <p:cNvPicPr>
+            <a:picLocks noChangeAspect="1" noChangeArrowheads="1"/>
+          </p:cNvPicPr>
+          <p:nvPr/>
+        </p:nvPicPr>
+        <p:blipFill>
+          <a:blip r:embed="rId2">
+            <a:extLst>
+              <a:ext uri="{28A0092B-C50C-407E-A947-70E740481C1C}">
+                <a14:useLocalDpi xmlns:a14="http://schemas.microsoft.com/office/drawing/2010/main" val="0"/>
+              </a:ext>
+            </a:extLst>
+          </a:blip>
+          <a:srcRect/>
+          <a:stretch>
+            <a:fillRect/>
+          </a:stretch>
+        </p:blipFill>
+        <p:spPr bwMode="auto">
+          <a:xfrm>
+            <a:off x="304800" y="1143000"/>
+            <a:ext cx="8610600" cy="5495925"/>
+          </a:xfrm>
+          <a:prstGeom prst="rect">
+            <a:avLst/>
+          </a:prstGeom>
+          <a:noFill/>
+          <a:ln>
+            <a:noFill/>
+          </a:ln>
+          <a:extLst>
+            <a:ext uri="{909E8E84-426E-40DD-AFC4-6F175D3DCCD1}">
+              <a14:hiddenFill xmlns:a14="http://schemas.microsoft.com/office/drawing/2010/main">
+                <a:solidFill>
+                  <a:schemeClr val="accent1"/>
+                </a:solidFill>
+              </a14:hiddenFill>
+            </a:ext>
+            <a:ext uri="{91240B29-F687-4F45-9708-019B960494DF}">
+              <a14:hiddenLine xmlns:a14="http://schemas.microsoft.com/office/drawing/2010/main" w="9525">
+                <a:solidFill>
+                  <a:schemeClr val="tx1"/>
+                </a:solidFill>
+                <a:miter lim="800000"/>
+                <a:headEnd/>
+                <a:tailEnd/>
+              </a14:hiddenLine>
+            </a:ext>
+          </a:extLst>
+        </p:spPr>
+      </p:pic>
+    </p:spTree>
+    <p:extLst>
+      <p:ext uri="{BB962C8B-B14F-4D97-AF65-F5344CB8AC3E}">
+        <p14:creationId xmlns:p14="http://schemas.microsoft.com/office/powerpoint/2010/main" val="1071082827"/>
+      </p:ext>
+    </p:extLst>
+  </p:cSld>
+  <p:clrMapOvr>
+    <a:masterClrMapping/>
+  </p:clrMapOvr>
+</p:sld>
+</file>
+
+<file path=ppt/slides/slide15.xml><?xml version="1.0" encoding="utf-8"?>
+<p:sld xmlns:a="http://schemas.openxmlformats.org/drawingml/2006/main" xmlns:r="http://schemas.openxmlformats.org/officeDocument/2006/relationships" xmlns:p="http://schemas.openxmlformats.org/presentationml/2006/main">
+  <p:cSld>
+    <p:spTree>
+      <p:nvGrpSpPr>
+        <p:cNvPr id="1" name=""/>
+        <p:cNvGrpSpPr/>
+        <p:nvPr/>
+      </p:nvGrpSpPr>
+      <p:grpSpPr>
+        <a:xfrm>
+          <a:off x="0" y="0"/>
+          <a:ext cx="0" cy="0"/>
+          <a:chOff x="0" y="0"/>
+          <a:chExt cx="0" cy="0"/>
+        </a:xfrm>
+      </p:grpSpPr>
+      <p:sp>
+        <p:nvSpPr>
+          <p:cNvPr id="2" name="Title 1"/>
+          <p:cNvSpPr>
+            <a:spLocks noGrp="1"/>
+          </p:cNvSpPr>
+          <p:nvPr>
+            <p:ph type="title"/>
+          </p:nvPr>
+        </p:nvSpPr>
+        <p:spPr/>
+        <p:txBody>
+          <a:bodyPr>
+            <a:normAutofit/>
+          </a:bodyPr>
+          <a:lstStyle/>
+          <a:p>
+            <a:r>
+              <a:rPr lang="en-US" sz="3600" dirty="0" smtClean="0"/>
+              <a:t>Observation</a:t>
+            </a:r>
+            <a:endParaRPr lang="en-US" sz="3600" dirty="0"/>
+          </a:p>
+        </p:txBody>
+      </p:sp>
+      <p:sp>
+        <p:nvSpPr>
+          <p:cNvPr id="3" name="Content Placeholder 2"/>
+          <p:cNvSpPr>
+            <a:spLocks noGrp="1"/>
+          </p:cNvSpPr>
+          <p:nvPr>
+            <p:ph idx="1"/>
+          </p:nvPr>
+        </p:nvSpPr>
+        <p:spPr/>
+        <p:txBody>
+          <a:bodyPr/>
+          <a:lstStyle/>
+          <a:p>
+            <a:r>
+              <a:rPr lang="en-US" dirty="0" smtClean="0"/>
+              <a:t>All other factors match but the Annual income is less</a:t>
+            </a:r>
+            <a:endParaRPr lang="en-US" dirty="0"/>
+          </a:p>
+        </p:txBody>
+      </p:sp>
+    </p:spTree>
+    <p:extLst>
+      <p:ext uri="{BB962C8B-B14F-4D97-AF65-F5344CB8AC3E}">
+        <p14:creationId xmlns:p14="http://schemas.microsoft.com/office/powerpoint/2010/main" val="1489099254"/>
+      </p:ext>
+    </p:extLst>
+  </p:cSld>
+  <p:clrMapOvr>
+    <a:masterClrMapping/>
+  </p:clrMapOvr>
+</p:sld>
+</file>
+
+<file path=ppt/slides/slide16.xml><?xml version="1.0" encoding="utf-8"?>
+<p:sld xmlns:a="http://schemas.openxmlformats.org/drawingml/2006/main" xmlns:r="http://schemas.openxmlformats.org/officeDocument/2006/relationships" xmlns:p="http://schemas.openxmlformats.org/presentationml/2006/main">
+  <p:cSld>
+    <p:spTree>
+      <p:nvGrpSpPr>
+        <p:cNvPr id="1" name=""/>
+        <p:cNvGrpSpPr/>
+        <p:nvPr/>
+      </p:nvGrpSpPr>
+      <p:grpSpPr>
+        <a:xfrm>
+          <a:off x="0" y="0"/>
+          <a:ext cx="0" cy="0"/>
+          <a:chOff x="0" y="0"/>
+          <a:chExt cx="0" cy="0"/>
+        </a:xfrm>
+      </p:grpSpPr>
+      <p:sp>
+        <p:nvSpPr>
+          <p:cNvPr id="2" name="Title 1"/>
+          <p:cNvSpPr>
+            <a:spLocks noGrp="1"/>
+          </p:cNvSpPr>
+          <p:nvPr>
+            <p:ph type="title"/>
+          </p:nvPr>
+        </p:nvSpPr>
+        <p:spPr/>
+        <p:txBody>
+          <a:bodyPr/>
+          <a:lstStyle/>
+          <a:p>
+            <a:r>
+              <a:rPr lang="en-US" dirty="0" smtClean="0"/>
+              <a:t>A pass to B overall</a:t>
+            </a:r>
+            <a:endParaRPr lang="en-US" dirty="0"/>
+          </a:p>
+        </p:txBody>
+      </p:sp>
+      <p:pic>
+        <p:nvPicPr>
+          <p:cNvPr id="7170" name="Picture 2"/>
+          <p:cNvPicPr>
+            <a:picLocks noGrp="1" noChangeAspect="1" noChangeArrowheads="1"/>
+          </p:cNvPicPr>
+          <p:nvPr>
+            <p:ph idx="1"/>
+          </p:nvPr>
+        </p:nvPicPr>
+        <p:blipFill>
+          <a:blip r:embed="rId2">
+            <a:extLst>
+              <a:ext uri="{28A0092B-C50C-407E-A947-70E740481C1C}">
+                <a14:useLocalDpi xmlns:a14="http://schemas.microsoft.com/office/drawing/2010/main" val="0"/>
+              </a:ext>
+            </a:extLst>
+          </a:blip>
+          <a:srcRect/>
+          <a:stretch>
+            <a:fillRect/>
+          </a:stretch>
+        </p:blipFill>
+        <p:spPr bwMode="auto">
+          <a:xfrm>
+            <a:off x="0" y="1143000"/>
+            <a:ext cx="9144000" cy="5486400"/>
+          </a:xfrm>
+          <a:prstGeom prst="rect">
+            <a:avLst/>
+          </a:prstGeom>
+          <a:noFill/>
+          <a:ln>
+            <a:noFill/>
+          </a:ln>
+          <a:extLst>
+            <a:ext uri="{909E8E84-426E-40DD-AFC4-6F175D3DCCD1}">
+              <a14:hiddenFill xmlns:a14="http://schemas.microsoft.com/office/drawing/2010/main">
+                <a:solidFill>
+                  <a:schemeClr val="accent1"/>
+                </a:solidFill>
+              </a14:hiddenFill>
+            </a:ext>
+            <a:ext uri="{91240B29-F687-4F45-9708-019B960494DF}">
+              <a14:hiddenLine xmlns:a14="http://schemas.microsoft.com/office/drawing/2010/main" w="9525">
+                <a:solidFill>
+                  <a:schemeClr val="tx1"/>
+                </a:solidFill>
+                <a:miter lim="800000"/>
+                <a:headEnd/>
+                <a:tailEnd/>
+              </a14:hiddenLine>
+            </a:ext>
+          </a:extLst>
+        </p:spPr>
+      </p:pic>
+    </p:spTree>
+    <p:extLst>
+      <p:ext uri="{BB962C8B-B14F-4D97-AF65-F5344CB8AC3E}">
+        <p14:creationId xmlns:p14="http://schemas.microsoft.com/office/powerpoint/2010/main" val="1896110509"/>
+      </p:ext>
+    </p:extLst>
+  </p:cSld>
+  <p:clrMapOvr>
+    <a:masterClrMapping/>
+  </p:clrMapOvr>
+</p:sld>
+</file>
+
+<file path=ppt/slides/slide17.xml><?xml version="1.0" encoding="utf-8"?>
+<p:sld xmlns:a="http://schemas.openxmlformats.org/drawingml/2006/main" xmlns:r="http://schemas.openxmlformats.org/officeDocument/2006/relationships" xmlns:p="http://schemas.openxmlformats.org/presentationml/2006/main">
+  <p:cSld>
+    <p:spTree>
+      <p:nvGrpSpPr>
+        <p:cNvPr id="1" name=""/>
+        <p:cNvGrpSpPr/>
+        <p:nvPr/>
+      </p:nvGrpSpPr>
+      <p:grpSpPr>
+        <a:xfrm>
+          <a:off x="0" y="0"/>
+          <a:ext cx="0" cy="0"/>
+          <a:chOff x="0" y="0"/>
+          <a:chExt cx="0" cy="0"/>
+        </a:xfrm>
+      </p:grpSpPr>
+      <p:sp>
+        <p:nvSpPr>
+          <p:cNvPr id="2" name="Title 1"/>
+          <p:cNvSpPr>
+            <a:spLocks noGrp="1"/>
+          </p:cNvSpPr>
+          <p:nvPr>
+            <p:ph type="title"/>
+          </p:nvPr>
+        </p:nvSpPr>
+        <p:spPr/>
+        <p:txBody>
+          <a:bodyPr>
+            <a:normAutofit/>
+          </a:bodyPr>
+          <a:lstStyle/>
+          <a:p>
+            <a:r>
+              <a:rPr lang="en-US" sz="3600" dirty="0" smtClean="0"/>
+              <a:t>Observation</a:t>
+            </a:r>
+            <a:endParaRPr lang="en-US" sz="3600" dirty="0"/>
+          </a:p>
+        </p:txBody>
+      </p:sp>
+      <p:pic>
+        <p:nvPicPr>
+          <p:cNvPr id="8194" name="Picture 2"/>
+          <p:cNvPicPr>
+            <a:picLocks noGrp="1" noChangeAspect="1" noChangeArrowheads="1"/>
+          </p:cNvPicPr>
+          <p:nvPr>
+            <p:ph idx="1"/>
+          </p:nvPr>
+        </p:nvPicPr>
+        <p:blipFill>
+          <a:blip r:embed="rId2">
+            <a:extLst>
+              <a:ext uri="{28A0092B-C50C-407E-A947-70E740481C1C}">
+                <a14:useLocalDpi xmlns:a14="http://schemas.microsoft.com/office/drawing/2010/main" val="0"/>
+              </a:ext>
+            </a:extLst>
+          </a:blip>
+          <a:srcRect/>
+          <a:stretch>
+            <a:fillRect/>
+          </a:stretch>
+        </p:blipFill>
+        <p:spPr bwMode="auto">
+          <a:xfrm>
+            <a:off x="609601" y="1600200"/>
+            <a:ext cx="7315200" cy="4876800"/>
+          </a:xfrm>
+          <a:prstGeom prst="rect">
+            <a:avLst/>
+          </a:prstGeom>
+          <a:noFill/>
+          <a:ln>
+            <a:noFill/>
+          </a:ln>
+          <a:extLst>
+            <a:ext uri="{909E8E84-426E-40DD-AFC4-6F175D3DCCD1}">
+              <a14:hiddenFill xmlns:a14="http://schemas.microsoft.com/office/drawing/2010/main">
+                <a:solidFill>
+                  <a:schemeClr val="accent1"/>
+                </a:solidFill>
+              </a14:hiddenFill>
+            </a:ext>
+            <a:ext uri="{91240B29-F687-4F45-9708-019B960494DF}">
+              <a14:hiddenLine xmlns:a14="http://schemas.microsoft.com/office/drawing/2010/main" w="9525">
+                <a:solidFill>
+                  <a:schemeClr val="tx1"/>
+                </a:solidFill>
+                <a:miter lim="800000"/>
+                <a:headEnd/>
+                <a:tailEnd/>
+              </a14:hiddenLine>
+            </a:ext>
+          </a:extLst>
+        </p:spPr>
+      </p:pic>
+    </p:spTree>
+    <p:extLst>
+      <p:ext uri="{BB962C8B-B14F-4D97-AF65-F5344CB8AC3E}">
+        <p14:creationId xmlns:p14="http://schemas.microsoft.com/office/powerpoint/2010/main" val="387626281"/>
+      </p:ext>
+    </p:extLst>
+  </p:cSld>
+  <p:clrMapOvr>
+    <a:masterClrMapping/>
+  </p:clrMapOvr>
+</p:sld>
+</file>
+
+<file path=ppt/slides/slide18.xml><?xml version="1.0" encoding="utf-8"?>
+<p:sld xmlns:a="http://schemas.openxmlformats.org/drawingml/2006/main" xmlns:r="http://schemas.openxmlformats.org/officeDocument/2006/relationships" xmlns:p="http://schemas.openxmlformats.org/presentationml/2006/main">
+  <p:cSld>
+    <p:spTree>
+      <p:nvGrpSpPr>
+        <p:cNvPr id="1" name=""/>
+        <p:cNvGrpSpPr/>
+        <p:nvPr/>
+      </p:nvGrpSpPr>
+      <p:grpSpPr>
+        <a:xfrm>
+          <a:off x="0" y="0"/>
+          <a:ext cx="0" cy="0"/>
+          <a:chOff x="0" y="0"/>
+          <a:chExt cx="0" cy="0"/>
+        </a:xfrm>
+      </p:grpSpPr>
+      <p:sp>
+        <p:nvSpPr>
+          <p:cNvPr id="2" name="Title 1"/>
+          <p:cNvSpPr>
+            <a:spLocks noGrp="1"/>
+          </p:cNvSpPr>
+          <p:nvPr>
+            <p:ph type="title"/>
+          </p:nvPr>
+        </p:nvSpPr>
+        <p:spPr/>
+        <p:txBody>
+          <a:bodyPr/>
+          <a:lstStyle/>
+          <a:p>
+            <a:r>
+              <a:rPr lang="en-US" dirty="0" smtClean="0"/>
+              <a:t>Top 20 cities FP and CO Graph</a:t>
+            </a:r>
+            <a:endParaRPr lang="en-US" dirty="0"/>
+          </a:p>
+        </p:txBody>
+      </p:sp>
+      <p:pic>
+        <p:nvPicPr>
+          <p:cNvPr id="9218" name="Picture 2"/>
+          <p:cNvPicPr>
+            <a:picLocks noGrp="1" noChangeAspect="1" noChangeArrowheads="1"/>
+          </p:cNvPicPr>
+          <p:nvPr>
+            <p:ph idx="1"/>
+          </p:nvPr>
+        </p:nvPicPr>
+        <p:blipFill>
+          <a:blip r:embed="rId2">
+            <a:extLst>
+              <a:ext uri="{28A0092B-C50C-407E-A947-70E740481C1C}">
+                <a14:useLocalDpi xmlns:a14="http://schemas.microsoft.com/office/drawing/2010/main" val="0"/>
+              </a:ext>
+            </a:extLst>
+          </a:blip>
+          <a:srcRect/>
+          <a:stretch>
+            <a:fillRect/>
+          </a:stretch>
+        </p:blipFill>
+        <p:spPr bwMode="auto">
+          <a:xfrm>
+            <a:off x="0" y="1295400"/>
+            <a:ext cx="8763000" cy="5410199"/>
+          </a:xfrm>
+          <a:prstGeom prst="rect">
+            <a:avLst/>
+          </a:prstGeom>
+          <a:noFill/>
+          <a:ln>
+            <a:noFill/>
+          </a:ln>
+          <a:extLst>
+            <a:ext uri="{909E8E84-426E-40DD-AFC4-6F175D3DCCD1}">
+              <a14:hiddenFill xmlns:a14="http://schemas.microsoft.com/office/drawing/2010/main">
+                <a:solidFill>
+                  <a:schemeClr val="accent1"/>
+                </a:solidFill>
+              </a14:hiddenFill>
+            </a:ext>
+            <a:ext uri="{91240B29-F687-4F45-9708-019B960494DF}">
+              <a14:hiddenLine xmlns:a14="http://schemas.microsoft.com/office/drawing/2010/main" w="9525">
+                <a:solidFill>
+                  <a:schemeClr val="tx1"/>
+                </a:solidFill>
+                <a:miter lim="800000"/>
+                <a:headEnd/>
+                <a:tailEnd/>
+              </a14:hiddenLine>
+            </a:ext>
+          </a:extLst>
+        </p:spPr>
+      </p:pic>
+    </p:spTree>
+    <p:extLst>
+      <p:ext uri="{BB962C8B-B14F-4D97-AF65-F5344CB8AC3E}">
+        <p14:creationId xmlns:p14="http://schemas.microsoft.com/office/powerpoint/2010/main" val="2394964315"/>
+      </p:ext>
+    </p:extLst>
+  </p:cSld>
+  <p:clrMapOvr>
+    <a:masterClrMapping/>
+  </p:clrMapOvr>
+</p:sld>
+</file>
+
+<file path=ppt/slides/slide19.xml><?xml version="1.0" encoding="utf-8"?>
+<p:sld xmlns:a="http://schemas.openxmlformats.org/drawingml/2006/main" xmlns:r="http://schemas.openxmlformats.org/officeDocument/2006/relationships" xmlns:p="http://schemas.openxmlformats.org/presentationml/2006/main">
+  <p:cSld>
+    <p:spTree>
+      <p:nvGrpSpPr>
+        <p:cNvPr id="1" name=""/>
+        <p:cNvGrpSpPr/>
+        <p:nvPr/>
+      </p:nvGrpSpPr>
+      <p:grpSpPr>
+        <a:xfrm>
+          <a:off x="0" y="0"/>
+          <a:ext cx="0" cy="0"/>
+          <a:chOff x="0" y="0"/>
+          <a:chExt cx="0" cy="0"/>
+        </a:xfrm>
+      </p:grpSpPr>
+      <p:sp>
+        <p:nvSpPr>
+          <p:cNvPr id="2" name="Title 1"/>
+          <p:cNvSpPr>
+            <a:spLocks noGrp="1"/>
+          </p:cNvSpPr>
+          <p:nvPr>
+            <p:ph type="title"/>
+          </p:nvPr>
+        </p:nvSpPr>
+        <p:spPr/>
+        <p:txBody>
+          <a:bodyPr/>
+          <a:lstStyle/>
+          <a:p>
+            <a:r>
+              <a:rPr lang="en-US" dirty="0" smtClean="0"/>
+              <a:t>Grades FP and CO</a:t>
+            </a:r>
+            <a:endParaRPr lang="en-US" dirty="0"/>
+          </a:p>
+        </p:txBody>
+      </p:sp>
+      <p:pic>
+        <p:nvPicPr>
+          <p:cNvPr id="10242" name="Picture 2"/>
+          <p:cNvPicPr>
+            <a:picLocks noGrp="1" noChangeAspect="1" noChangeArrowheads="1"/>
+          </p:cNvPicPr>
+          <p:nvPr>
+            <p:ph idx="1"/>
+          </p:nvPr>
+        </p:nvPicPr>
+        <p:blipFill>
+          <a:blip r:embed="rId2">
+            <a:extLst>
+              <a:ext uri="{28A0092B-C50C-407E-A947-70E740481C1C}">
+                <a14:useLocalDpi xmlns:a14="http://schemas.microsoft.com/office/drawing/2010/main" val="0"/>
+              </a:ext>
+            </a:extLst>
+          </a:blip>
+          <a:srcRect/>
+          <a:stretch>
+            <a:fillRect/>
+          </a:stretch>
+        </p:blipFill>
+        <p:spPr bwMode="auto">
+          <a:xfrm>
+            <a:off x="304800" y="1295400"/>
+            <a:ext cx="8458199" cy="5410200"/>
+          </a:xfrm>
+          <a:prstGeom prst="rect">
+            <a:avLst/>
+          </a:prstGeom>
+          <a:noFill/>
+          <a:ln>
+            <a:noFill/>
+          </a:ln>
+          <a:extLst>
+            <a:ext uri="{909E8E84-426E-40DD-AFC4-6F175D3DCCD1}">
+              <a14:hiddenFill xmlns:a14="http://schemas.microsoft.com/office/drawing/2010/main">
+                <a:solidFill>
+                  <a:schemeClr val="accent1"/>
+                </a:solidFill>
+              </a14:hiddenFill>
+            </a:ext>
+            <a:ext uri="{91240B29-F687-4F45-9708-019B960494DF}">
+              <a14:hiddenLine xmlns:a14="http://schemas.microsoft.com/office/drawing/2010/main" w="9525">
+                <a:solidFill>
+                  <a:schemeClr val="tx1"/>
+                </a:solidFill>
+                <a:miter lim="800000"/>
+                <a:headEnd/>
+                <a:tailEnd/>
+              </a14:hiddenLine>
+            </a:ext>
+          </a:extLst>
+        </p:spPr>
+      </p:pic>
+    </p:spTree>
+    <p:extLst>
+      <p:ext uri="{BB962C8B-B14F-4D97-AF65-F5344CB8AC3E}">
+        <p14:creationId xmlns:p14="http://schemas.microsoft.com/office/powerpoint/2010/main" val="2634226724"/>
+      </p:ext>
+    </p:extLst>
+  </p:cSld>
+  <p:clrMapOvr>
+    <a:masterClrMapping/>
+  </p:clrMapOvr>
+</p:sld>
+</file>
+
+<file path=ppt/slides/slide2.xml><?xml version="1.0" encoding="utf-8"?>
+<p:sld xmlns:a="http://schemas.openxmlformats.org/drawingml/2006/main" xmlns:r="http://schemas.openxmlformats.org/officeDocument/2006/relationships" xmlns:p="http://schemas.openxmlformats.org/presentationml/2006/main">
+  <p:cSld>
+    <p:spTree>
+      <p:nvGrpSpPr>
+        <p:cNvPr id="1" name=""/>
+        <p:cNvGrpSpPr/>
+        <p:nvPr/>
+      </p:nvGrpSpPr>
+      <p:grpSpPr>
+        <a:xfrm>
+          <a:off x="0" y="0"/>
+          <a:ext cx="0" cy="0"/>
+          <a:chOff x="0" y="0"/>
+          <a:chExt cx="0" cy="0"/>
+        </a:xfrm>
+      </p:grpSpPr>
+      <p:sp>
+        <p:nvSpPr>
+          <p:cNvPr id="2" name="Title 1"/>
+          <p:cNvSpPr>
+            <a:spLocks noGrp="1"/>
+          </p:cNvSpPr>
+          <p:nvPr>
+            <p:ph type="title"/>
+          </p:nvPr>
+        </p:nvSpPr>
+        <p:spPr/>
+        <p:txBody>
+          <a:bodyPr/>
+          <a:lstStyle/>
+          <a:p>
+            <a:r>
+              <a:rPr lang="en-US" dirty="0" smtClean="0"/>
+              <a:t>Outliers</a:t>
+            </a:r>
+            <a:endParaRPr lang="en-US" dirty="0"/>
+          </a:p>
+        </p:txBody>
+      </p:sp>
+      <p:sp>
+        <p:nvSpPr>
+          <p:cNvPr id="6" name="Text Placeholder 5"/>
+          <p:cNvSpPr>
+            <a:spLocks noGrp="1"/>
+          </p:cNvSpPr>
+          <p:nvPr>
+            <p:ph type="body" idx="1"/>
+          </p:nvPr>
+        </p:nvSpPr>
+        <p:spPr/>
+        <p:txBody>
+          <a:bodyPr/>
+          <a:lstStyle/>
+          <a:p>
+            <a:r>
+              <a:rPr lang="en-US" dirty="0"/>
+              <a:t>Before Removing Outliers</a:t>
+            </a:r>
+          </a:p>
+        </p:txBody>
+      </p:sp>
+      <p:pic>
+        <p:nvPicPr>
+          <p:cNvPr id="9" name="Content Placeholder 8"/>
+          <p:cNvPicPr>
+            <a:picLocks noGrp="1" noChangeAspect="1"/>
+          </p:cNvPicPr>
+          <p:nvPr>
+            <p:ph sz="half" idx="2"/>
+          </p:nvPr>
+        </p:nvPicPr>
+        <p:blipFill>
+          <a:blip r:embed="rId2">
+            <a:extLst>
+              <a:ext uri="{28A0092B-C50C-407E-A947-70E740481C1C}">
+                <a14:useLocalDpi xmlns:a14="http://schemas.microsoft.com/office/drawing/2010/main" val="0"/>
+              </a:ext>
+            </a:extLst>
+          </a:blip>
+          <a:stretch>
+            <a:fillRect/>
+          </a:stretch>
+        </p:blipFill>
+        <p:spPr>
+          <a:xfrm>
+            <a:off x="457200" y="2705215"/>
+            <a:ext cx="4040188" cy="2890608"/>
+          </a:xfrm>
+        </p:spPr>
+      </p:pic>
+      <p:sp>
+        <p:nvSpPr>
+          <p:cNvPr id="7" name="Text Placeholder 6"/>
+          <p:cNvSpPr>
+            <a:spLocks noGrp="1"/>
+          </p:cNvSpPr>
+          <p:nvPr>
+            <p:ph type="body" sz="quarter" idx="3"/>
+          </p:nvPr>
+        </p:nvSpPr>
+        <p:spPr/>
+        <p:txBody>
+          <a:bodyPr/>
+          <a:lstStyle/>
+          <a:p>
+            <a:r>
+              <a:rPr lang="en-US" dirty="0" smtClean="0"/>
+              <a:t>After Removing Outlier</a:t>
+            </a:r>
+            <a:endParaRPr lang="en-US" dirty="0"/>
+          </a:p>
+        </p:txBody>
+      </p:sp>
+      <p:pic>
+        <p:nvPicPr>
+          <p:cNvPr id="10" name="Content Placeholder 9"/>
+          <p:cNvPicPr>
+            <a:picLocks noGrp="1" noChangeAspect="1"/>
+          </p:cNvPicPr>
+          <p:nvPr>
+            <p:ph sz="quarter" idx="4"/>
+          </p:nvPr>
+        </p:nvPicPr>
+        <p:blipFill>
+          <a:blip r:embed="rId3">
+            <a:extLst>
+              <a:ext uri="{28A0092B-C50C-407E-A947-70E740481C1C}">
+                <a14:useLocalDpi xmlns:a14="http://schemas.microsoft.com/office/drawing/2010/main" val="0"/>
+              </a:ext>
+            </a:extLst>
+          </a:blip>
+          <a:stretch>
+            <a:fillRect/>
+          </a:stretch>
+        </p:blipFill>
+        <p:spPr>
+          <a:xfrm>
+            <a:off x="4645025" y="2615353"/>
+            <a:ext cx="4041775" cy="3070331"/>
+          </a:xfrm>
+        </p:spPr>
+      </p:pic>
+      <p:sp>
+        <p:nvSpPr>
+          <p:cNvPr id="5" name="TextBox 4"/>
+          <p:cNvSpPr txBox="1"/>
+          <p:nvPr/>
+        </p:nvSpPr>
+        <p:spPr>
+          <a:xfrm>
+            <a:off x="4800600" y="2209800"/>
+            <a:ext cx="184731" cy="2031325"/>
+          </a:xfrm>
+          <a:prstGeom prst="rect">
+            <a:avLst/>
+          </a:prstGeom>
+          <a:noFill/>
+        </p:spPr>
+        <p:txBody>
+          <a:bodyPr wrap="none" rtlCol="0">
+            <a:spAutoFit/>
+          </a:bodyPr>
+          <a:lstStyle/>
+          <a:p>
+            <a:endParaRPr lang="en-US" dirty="0"/>
+          </a:p>
+          <a:p>
+            <a:endParaRPr lang="en-US" dirty="0" smtClean="0"/>
+          </a:p>
+          <a:p>
+            <a:endParaRPr lang="en-US" dirty="0"/>
+          </a:p>
+          <a:p>
+            <a:endParaRPr lang="en-US" dirty="0" smtClean="0"/>
+          </a:p>
+          <a:p>
+            <a:endParaRPr lang="en-US" dirty="0"/>
+          </a:p>
+          <a:p>
+            <a:endParaRPr lang="en-US" dirty="0" smtClean="0"/>
+          </a:p>
+          <a:p>
+            <a:endParaRPr lang="en-US" dirty="0"/>
+          </a:p>
+        </p:txBody>
+      </p:sp>
+    </p:spTree>
+    <p:extLst>
+      <p:ext uri="{BB962C8B-B14F-4D97-AF65-F5344CB8AC3E}">
+        <p14:creationId xmlns:p14="http://schemas.microsoft.com/office/powerpoint/2010/main" val="709624710"/>
+      </p:ext>
+    </p:extLst>
+  </p:cSld>
+  <p:clrMapOvr>
+    <a:masterClrMapping/>
+  </p:clrMapOvr>
+  <p:timing>
+    <p:tnLst>
+      <p:par>
+        <p:cTn id="1" dur="indefinite" restart="never" nodeType="tmRoot"/>
+      </p:par>
+    </p:tnLst>
+  </p:timing>
+</p:sld>
+</file>
+
+<file path=ppt/slides/slide20.xml><?xml version="1.0" encoding="utf-8"?>
+<p:sld xmlns:a="http://schemas.openxmlformats.org/drawingml/2006/main" xmlns:r="http://schemas.openxmlformats.org/officeDocument/2006/relationships" xmlns:p="http://schemas.openxmlformats.org/presentationml/2006/main">
+  <p:cSld>
+    <p:spTree>
+      <p:nvGrpSpPr>
+        <p:cNvPr id="1" name=""/>
+        <p:cNvGrpSpPr/>
+        <p:nvPr/>
+      </p:nvGrpSpPr>
+      <p:grpSpPr>
+        <a:xfrm>
+          <a:off x="0" y="0"/>
+          <a:ext cx="0" cy="0"/>
+          <a:chOff x="0" y="0"/>
+          <a:chExt cx="0" cy="0"/>
+        </a:xfrm>
+      </p:grpSpPr>
+      <p:sp>
+        <p:nvSpPr>
+          <p:cNvPr id="2" name="Title 1"/>
+          <p:cNvSpPr>
+            <a:spLocks noGrp="1"/>
+          </p:cNvSpPr>
+          <p:nvPr>
+            <p:ph type="title"/>
+          </p:nvPr>
+        </p:nvSpPr>
+        <p:spPr/>
+        <p:txBody>
+          <a:bodyPr/>
+          <a:lstStyle/>
+          <a:p>
+            <a:r>
+              <a:rPr lang="en-US" dirty="0" smtClean="0"/>
+              <a:t>Moral of the Story</a:t>
+            </a:r>
+            <a:endParaRPr lang="en-US" dirty="0"/>
+          </a:p>
+        </p:txBody>
+      </p:sp>
+      <p:sp>
+        <p:nvSpPr>
+          <p:cNvPr id="3" name="Content Placeholder 2"/>
+          <p:cNvSpPr>
+            <a:spLocks noGrp="1"/>
+          </p:cNvSpPr>
+          <p:nvPr>
+            <p:ph idx="1"/>
+          </p:nvPr>
+        </p:nvSpPr>
+        <p:spPr/>
+        <p:txBody>
+          <a:bodyPr>
+            <a:normAutofit fontScale="92500" lnSpcReduction="20000"/>
+          </a:bodyPr>
+          <a:lstStyle/>
+          <a:p>
+            <a:endParaRPr lang="en-US" sz="1800" dirty="0"/>
+          </a:p>
+          <a:p>
+            <a:endParaRPr lang="en-US" sz="1800" dirty="0"/>
+          </a:p>
+          <a:p>
+            <a:r>
+              <a:rPr lang="en-US" sz="1800" dirty="0" smtClean="0"/>
+              <a:t> </a:t>
+            </a:r>
+            <a:r>
+              <a:rPr lang="en-US" sz="1800" dirty="0"/>
+              <a:t>Average Loan Amount  </a:t>
+            </a:r>
+            <a:r>
+              <a:rPr lang="en-US" sz="1800" dirty="0" smtClean="0"/>
+              <a:t>should be considered where overall after paying the total debits surplus amount is left</a:t>
+            </a:r>
+          </a:p>
+          <a:p>
+            <a:endParaRPr lang="en-US" sz="1800" dirty="0"/>
+          </a:p>
+          <a:p>
+            <a:r>
+              <a:rPr lang="en-US" sz="1800" dirty="0"/>
+              <a:t> </a:t>
+            </a:r>
+            <a:r>
+              <a:rPr lang="en-US" sz="1800" dirty="0" smtClean="0"/>
+              <a:t>Term should be less </a:t>
+            </a:r>
+            <a:r>
+              <a:rPr lang="en-US" sz="1800" dirty="0" err="1" smtClean="0"/>
+              <a:t>i.e</a:t>
+            </a:r>
+            <a:r>
+              <a:rPr lang="en-US" sz="1800" dirty="0" smtClean="0"/>
+              <a:t> 36 months</a:t>
+            </a:r>
+          </a:p>
+          <a:p>
+            <a:endParaRPr lang="en-US" sz="1800" dirty="0"/>
+          </a:p>
+          <a:p>
+            <a:r>
+              <a:rPr lang="en-US" sz="1800" dirty="0" smtClean="0"/>
+              <a:t>Rate </a:t>
+            </a:r>
+            <a:r>
+              <a:rPr lang="en-US" sz="1800" dirty="0"/>
+              <a:t>of Interest </a:t>
+            </a:r>
+            <a:r>
+              <a:rPr lang="en-US" sz="1800" dirty="0" smtClean="0"/>
+              <a:t> should be least</a:t>
+            </a:r>
+          </a:p>
+          <a:p>
+            <a:endParaRPr lang="en-US" sz="1800" dirty="0"/>
+          </a:p>
+          <a:p>
+            <a:r>
+              <a:rPr lang="en-US" sz="1800" dirty="0" smtClean="0"/>
+              <a:t>Revolving </a:t>
+            </a:r>
+            <a:r>
+              <a:rPr lang="en-US" sz="1800" dirty="0"/>
+              <a:t>Credit balance should be </a:t>
+            </a:r>
+            <a:r>
+              <a:rPr lang="en-US" sz="1800" dirty="0" smtClean="0"/>
+              <a:t>least</a:t>
+            </a:r>
+          </a:p>
+          <a:p>
+            <a:endParaRPr lang="en-US" sz="1800" dirty="0" smtClean="0"/>
+          </a:p>
+          <a:p>
+            <a:r>
+              <a:rPr lang="en-US" sz="1800" dirty="0" smtClean="0"/>
+              <a:t>DTI  ratio should be low</a:t>
+            </a:r>
+          </a:p>
+          <a:p>
+            <a:endParaRPr lang="en-US" sz="1800" dirty="0" smtClean="0"/>
+          </a:p>
+          <a:p>
+            <a:r>
+              <a:rPr lang="en-US" sz="1800" dirty="0" smtClean="0"/>
+              <a:t> </a:t>
+            </a:r>
+            <a:r>
+              <a:rPr lang="en-US" sz="1800" dirty="0" err="1" smtClean="0"/>
+              <a:t>Revolving_credit_utilization_in</a:t>
+            </a:r>
+            <a:r>
+              <a:rPr lang="en-US" sz="1800" dirty="0"/>
+              <a:t>_% </a:t>
+            </a:r>
+            <a:r>
+              <a:rPr lang="en-US" sz="1800" dirty="0" smtClean="0"/>
+              <a:t>should be low</a:t>
+            </a:r>
+          </a:p>
+          <a:p>
+            <a:endParaRPr lang="en-US" sz="1800" dirty="0" smtClean="0"/>
+          </a:p>
+          <a:p>
+            <a:r>
+              <a:rPr lang="en-US" sz="1800" dirty="0" err="1" smtClean="0"/>
+              <a:t>No_open_credit_lines</a:t>
+            </a:r>
+            <a:r>
+              <a:rPr lang="en-US" sz="1800" dirty="0" smtClean="0"/>
+              <a:t> and  </a:t>
+            </a:r>
+            <a:r>
+              <a:rPr lang="en-US" sz="1800" dirty="0" err="1"/>
+              <a:t>Total_no_credit_lines</a:t>
+            </a:r>
+            <a:r>
+              <a:rPr lang="en-US" sz="1800" dirty="0"/>
+              <a:t>  </a:t>
+            </a:r>
+            <a:r>
+              <a:rPr lang="en-US" sz="1800" dirty="0" smtClean="0"/>
+              <a:t>should be more but its utilization should be least otherwise the CIBIL SCORE may go bad if not correctly managed.</a:t>
+            </a:r>
+            <a:endParaRPr lang="en-US" sz="1800" dirty="0"/>
+          </a:p>
+          <a:p>
+            <a:endParaRPr lang="en-US" sz="1800" dirty="0"/>
+          </a:p>
+          <a:p>
+            <a:endParaRPr lang="en-US" sz="1800" dirty="0"/>
+          </a:p>
+        </p:txBody>
+      </p:sp>
+    </p:spTree>
+    <p:extLst>
+      <p:ext uri="{BB962C8B-B14F-4D97-AF65-F5344CB8AC3E}">
+        <p14:creationId xmlns:p14="http://schemas.microsoft.com/office/powerpoint/2010/main" val="537058040"/>
+      </p:ext>
+    </p:extLst>
+  </p:cSld>
+  <p:clrMapOvr>
+    <a:masterClrMapping/>
+  </p:clrMapOvr>
+</p:sld>
+</file>
+
+<file path=ppt/slides/slide3.xml><?xml version="1.0" encoding="utf-8"?>
+<p:sld xmlns:a="http://schemas.openxmlformats.org/drawingml/2006/main" xmlns:r="http://schemas.openxmlformats.org/officeDocument/2006/relationships" xmlns:p="http://schemas.openxmlformats.org/presentationml/2006/main">
+  <p:cSld>
+    <p:spTree>
+      <p:nvGrpSpPr>
+        <p:cNvPr id="1" name=""/>
+        <p:cNvGrpSpPr/>
+        <p:nvPr/>
+      </p:nvGrpSpPr>
+      <p:grpSpPr>
+        <a:xfrm>
+          <a:off x="0" y="0"/>
+          <a:ext cx="0" cy="0"/>
+          <a:chOff x="0" y="0"/>
+          <a:chExt cx="0" cy="0"/>
+        </a:xfrm>
+      </p:grpSpPr>
+      <p:sp>
+        <p:nvSpPr>
+          <p:cNvPr id="2" name="Title 1"/>
+          <p:cNvSpPr>
+            <a:spLocks noGrp="1"/>
+          </p:cNvSpPr>
+          <p:nvPr>
+            <p:ph type="title"/>
+          </p:nvPr>
+        </p:nvSpPr>
+        <p:spPr/>
+        <p:txBody>
+          <a:bodyPr/>
+          <a:lstStyle/>
+          <a:p>
+            <a:r>
+              <a:rPr lang="en-US" dirty="0" smtClean="0"/>
+              <a:t>Factor 1</a:t>
+            </a:r>
+            <a:endParaRPr lang="en-US" dirty="0"/>
+          </a:p>
+        </p:txBody>
+      </p:sp>
+      <p:sp>
+        <p:nvSpPr>
+          <p:cNvPr id="3" name="Content Placeholder 2"/>
+          <p:cNvSpPr>
+            <a:spLocks noGrp="1"/>
+          </p:cNvSpPr>
+          <p:nvPr>
+            <p:ph idx="1"/>
+          </p:nvPr>
+        </p:nvSpPr>
+        <p:spPr/>
+        <p:txBody>
+          <a:bodyPr>
+            <a:normAutofit fontScale="92500"/>
+          </a:bodyPr>
+          <a:lstStyle/>
+          <a:p>
+            <a:r>
+              <a:rPr lang="en-US" dirty="0"/>
+              <a:t> The total number of credit lines currently in the borrower's credit </a:t>
+            </a:r>
+            <a:r>
+              <a:rPr lang="en-US" dirty="0" smtClean="0"/>
+              <a:t>file is inversely proportional to Interest Rate</a:t>
+            </a:r>
+          </a:p>
+          <a:p>
+            <a:r>
+              <a:rPr lang="en-US" dirty="0"/>
+              <a:t>More the </a:t>
+            </a:r>
+            <a:r>
+              <a:rPr lang="en-US" dirty="0" smtClean="0"/>
+              <a:t>total </a:t>
+            </a:r>
+            <a:r>
+              <a:rPr lang="en-US" dirty="0"/>
+              <a:t>number of credit lines currently in the borrower's credit </a:t>
+            </a:r>
+            <a:r>
+              <a:rPr lang="en-US" dirty="0" smtClean="0"/>
+              <a:t>file more will be the interest Rate</a:t>
+            </a:r>
+          </a:p>
+          <a:p>
+            <a:r>
+              <a:rPr lang="en-US" dirty="0" smtClean="0"/>
+              <a:t>Total </a:t>
+            </a:r>
+            <a:r>
+              <a:rPr lang="en-US" dirty="0"/>
+              <a:t>number of credit lines currently in the borrower's credit </a:t>
+            </a:r>
+            <a:r>
+              <a:rPr lang="en-US" dirty="0" smtClean="0"/>
+              <a:t>file (</a:t>
+            </a:r>
+            <a:r>
+              <a:rPr lang="en-US" dirty="0" err="1" smtClean="0"/>
+              <a:t>Total_acc</a:t>
+            </a:r>
+            <a:r>
+              <a:rPr lang="en-US" dirty="0" smtClean="0"/>
+              <a:t>)  is the greatest Factor for the Applicant to go Defaulter</a:t>
+            </a:r>
+            <a:endParaRPr lang="en-US" dirty="0"/>
+          </a:p>
+        </p:txBody>
+      </p:sp>
+    </p:spTree>
+    <p:extLst>
+      <p:ext uri="{BB962C8B-B14F-4D97-AF65-F5344CB8AC3E}">
+        <p14:creationId xmlns:p14="http://schemas.microsoft.com/office/powerpoint/2010/main" val="1636116545"/>
+      </p:ext>
+    </p:extLst>
+  </p:cSld>
+  <p:clrMapOvr>
+    <a:masterClrMapping/>
+  </p:clrMapOvr>
+  <p:timing>
+    <p:tnLst>
+      <p:par>
+        <p:cTn id="1" dur="indefinite" restart="never" nodeType="tmRoot"/>
+      </p:par>
+    </p:tnLst>
+  </p:timing>
+</p:sld>
+</file>
+
+<file path=ppt/slides/slide4.xml><?xml version="1.0" encoding="utf-8"?>
+<p:sld xmlns:a="http://schemas.openxmlformats.org/drawingml/2006/main" xmlns:r="http://schemas.openxmlformats.org/officeDocument/2006/relationships" xmlns:p="http://schemas.openxmlformats.org/presentationml/2006/main">
+  <p:cSld>
+    <p:spTree>
+      <p:nvGrpSpPr>
+        <p:cNvPr id="1" name=""/>
+        <p:cNvGrpSpPr/>
+        <p:nvPr/>
+      </p:nvGrpSpPr>
+      <p:grpSpPr>
+        <a:xfrm>
+          <a:off x="0" y="0"/>
+          <a:ext cx="0" cy="0"/>
+          <a:chOff x="0" y="0"/>
+          <a:chExt cx="0" cy="0"/>
+        </a:xfrm>
+      </p:grpSpPr>
+      <p:pic>
+        <p:nvPicPr>
+          <p:cNvPr id="5" name="Picture 2"/>
+          <p:cNvPicPr>
+            <a:picLocks noChangeAspect="1" noChangeArrowheads="1"/>
+          </p:cNvPicPr>
+          <p:nvPr/>
+        </p:nvPicPr>
+        <p:blipFill>
+          <a:blip r:embed="rId2">
+            <a:extLst>
+              <a:ext uri="{28A0092B-C50C-407E-A947-70E740481C1C}">
+                <a14:useLocalDpi xmlns:a14="http://schemas.microsoft.com/office/drawing/2010/main" val="0"/>
+              </a:ext>
+            </a:extLst>
+          </a:blip>
+          <a:srcRect/>
+          <a:stretch>
+            <a:fillRect/>
+          </a:stretch>
+        </p:blipFill>
+        <p:spPr bwMode="auto">
+          <a:xfrm>
+            <a:off x="685800" y="990600"/>
+            <a:ext cx="7391400" cy="1485900"/>
+          </a:xfrm>
+          <a:prstGeom prst="rect">
+            <a:avLst/>
+          </a:prstGeom>
+          <a:noFill/>
+          <a:ln>
+            <a:noFill/>
+          </a:ln>
+          <a:extLst>
+            <a:ext uri="{909E8E84-426E-40DD-AFC4-6F175D3DCCD1}">
+              <a14:hiddenFill xmlns:a14="http://schemas.microsoft.com/office/drawing/2010/main">
+                <a:solidFill>
+                  <a:schemeClr val="accent1"/>
+                </a:solidFill>
+              </a14:hiddenFill>
+            </a:ext>
+            <a:ext uri="{91240B29-F687-4F45-9708-019B960494DF}">
+              <a14:hiddenLine xmlns:a14="http://schemas.microsoft.com/office/drawing/2010/main" w="9525">
+                <a:solidFill>
+                  <a:schemeClr val="tx1"/>
+                </a:solidFill>
+                <a:miter lim="800000"/>
+                <a:headEnd/>
+                <a:tailEnd/>
+              </a14:hiddenLine>
+            </a:ext>
+          </a:extLst>
+        </p:spPr>
+      </p:pic>
+    </p:spTree>
+    <p:extLst>
+      <p:ext uri="{BB962C8B-B14F-4D97-AF65-F5344CB8AC3E}">
+        <p14:creationId xmlns:p14="http://schemas.microsoft.com/office/powerpoint/2010/main" val="3416428563"/>
+      </p:ext>
+    </p:extLst>
+  </p:cSld>
+  <p:clrMapOvr>
+    <a:masterClrMapping/>
+  </p:clrMapOvr>
+  <p:timing>
+    <p:tnLst>
+      <p:par>
+        <p:cTn id="1" dur="indefinite" restart="never" nodeType="tmRoot"/>
+      </p:par>
+    </p:tnLst>
+  </p:timing>
+</p:sld>
+</file>
+
+<file path=ppt/slides/slide5.xml><?xml version="1.0" encoding="utf-8"?>
+<p:sld xmlns:a="http://schemas.openxmlformats.org/drawingml/2006/main" xmlns:r="http://schemas.openxmlformats.org/officeDocument/2006/relationships" xmlns:p="http://schemas.openxmlformats.org/presentationml/2006/main">
+  <p:cSld>
+    <p:spTree>
+      <p:nvGrpSpPr>
+        <p:cNvPr id="1" name=""/>
+        <p:cNvGrpSpPr/>
+        <p:nvPr/>
+      </p:nvGrpSpPr>
+      <p:grpSpPr>
+        <a:xfrm>
+          <a:off x="0" y="0"/>
+          <a:ext cx="0" cy="0"/>
+          <a:chOff x="0" y="0"/>
+          <a:chExt cx="0" cy="0"/>
+        </a:xfrm>
+      </p:grpSpPr>
+      <p:pic>
+        <p:nvPicPr>
+          <p:cNvPr id="1028" name="Picture 4"/>
+          <p:cNvPicPr>
+            <a:picLocks noGrp="1" noChangeAspect="1" noChangeArrowheads="1"/>
+          </p:cNvPicPr>
+          <p:nvPr>
+            <p:ph idx="1"/>
+          </p:nvPr>
+        </p:nvPicPr>
+        <p:blipFill>
+          <a:blip r:embed="rId2">
+            <a:extLst>
+              <a:ext uri="{28A0092B-C50C-407E-A947-70E740481C1C}">
+                <a14:useLocalDpi xmlns:a14="http://schemas.microsoft.com/office/drawing/2010/main" val="0"/>
+              </a:ext>
+            </a:extLst>
+          </a:blip>
+          <a:srcRect/>
+          <a:stretch>
+            <a:fillRect/>
+          </a:stretch>
+        </p:blipFill>
+        <p:spPr bwMode="auto">
+          <a:xfrm>
+            <a:off x="762000" y="914400"/>
+            <a:ext cx="7239000" cy="4811481"/>
+          </a:xfrm>
+          <a:prstGeom prst="rect">
+            <a:avLst/>
+          </a:prstGeom>
+          <a:noFill/>
+          <a:ln>
+            <a:noFill/>
+          </a:ln>
+          <a:extLst>
+            <a:ext uri="{909E8E84-426E-40DD-AFC4-6F175D3DCCD1}">
+              <a14:hiddenFill xmlns:a14="http://schemas.microsoft.com/office/drawing/2010/main">
+                <a:solidFill>
+                  <a:schemeClr val="accent1"/>
+                </a:solidFill>
+              </a14:hiddenFill>
+            </a:ext>
+            <a:ext uri="{91240B29-F687-4F45-9708-019B960494DF}">
+              <a14:hiddenLine xmlns:a14="http://schemas.microsoft.com/office/drawing/2010/main" w="9525">
+                <a:solidFill>
+                  <a:schemeClr val="tx1"/>
+                </a:solidFill>
+                <a:miter lim="800000"/>
+                <a:headEnd/>
+                <a:tailEnd/>
+              </a14:hiddenLine>
+            </a:ext>
+          </a:extLst>
+        </p:spPr>
+      </p:pic>
+      <p:sp>
+        <p:nvSpPr>
+          <p:cNvPr id="2" name="TextBox 1"/>
+          <p:cNvSpPr txBox="1"/>
+          <p:nvPr/>
+        </p:nvSpPr>
+        <p:spPr>
+          <a:xfrm>
+            <a:off x="533401" y="152400"/>
+            <a:ext cx="8077200" cy="584775"/>
+          </a:xfrm>
+          <a:prstGeom prst="rect">
+            <a:avLst/>
+          </a:prstGeom>
+        </p:spPr>
+        <p:style>
+          <a:lnRef idx="2">
+            <a:schemeClr val="dk1"/>
+          </a:lnRef>
+          <a:fillRef idx="1">
+            <a:schemeClr val="lt1"/>
+          </a:fillRef>
+          <a:effectRef idx="0">
+            <a:schemeClr val="dk1"/>
+          </a:effectRef>
+          <a:fontRef idx="minor">
+            <a:schemeClr val="dk1"/>
+          </a:fontRef>
+        </p:style>
+        <p:txBody>
+          <a:bodyPr wrap="square" rtlCol="0">
+            <a:spAutoFit/>
+          </a:bodyPr>
+          <a:lstStyle/>
+          <a:p>
+            <a:r>
+              <a:rPr lang="en-US" sz="3200" dirty="0"/>
+              <a:t>Factor </a:t>
+            </a:r>
+            <a:r>
+              <a:rPr lang="en-US" sz="3200" dirty="0" smtClean="0"/>
+              <a:t>1-Interest Rate – Univariate Analysis</a:t>
+            </a:r>
+            <a:endParaRPr lang="en-US" sz="3200" dirty="0"/>
+          </a:p>
+        </p:txBody>
+      </p:sp>
+    </p:spTree>
+    <p:extLst>
+      <p:ext uri="{BB962C8B-B14F-4D97-AF65-F5344CB8AC3E}">
+        <p14:creationId xmlns:p14="http://schemas.microsoft.com/office/powerpoint/2010/main" val="1152463637"/>
+      </p:ext>
+    </p:extLst>
+  </p:cSld>
+  <p:clrMapOvr>
+    <a:masterClrMapping/>
+  </p:clrMapOvr>
+  <p:timing>
+    <p:tnLst>
+      <p:par>
+        <p:cTn id="1" dur="indefinite" restart="never" nodeType="tmRoot"/>
+      </p:par>
+    </p:tnLst>
+  </p:timing>
+</p:sld>
+</file>
+
+<file path=ppt/slides/slide6.xml><?xml version="1.0" encoding="utf-8"?>
+<p:sld xmlns:a="http://schemas.openxmlformats.org/drawingml/2006/main" xmlns:r="http://schemas.openxmlformats.org/officeDocument/2006/relationships" xmlns:p="http://schemas.openxmlformats.org/presentationml/2006/main">
+  <p:cSld>
+    <p:spTree>
+      <p:nvGrpSpPr>
+        <p:cNvPr id="1" name=""/>
+        <p:cNvGrpSpPr/>
+        <p:nvPr/>
+      </p:nvGrpSpPr>
+      <p:grpSpPr>
+        <a:xfrm>
+          <a:off x="0" y="0"/>
+          <a:ext cx="0" cy="0"/>
+          <a:chOff x="0" y="0"/>
+          <a:chExt cx="0" cy="0"/>
+        </a:xfrm>
+      </p:grpSpPr>
+      <p:sp>
+        <p:nvSpPr>
+          <p:cNvPr id="2" name="Title 1"/>
+          <p:cNvSpPr>
+            <a:spLocks noGrp="1"/>
+          </p:cNvSpPr>
+          <p:nvPr>
+            <p:ph type="title"/>
+          </p:nvPr>
+        </p:nvSpPr>
+        <p:spPr/>
+        <p:txBody>
+          <a:bodyPr>
+            <a:normAutofit fontScale="90000"/>
+          </a:bodyPr>
+          <a:lstStyle/>
+          <a:p>
+            <a:r>
+              <a:rPr lang="en-US" sz="3600" dirty="0" smtClean="0"/>
+              <a:t>Factor </a:t>
+            </a:r>
+            <a:r>
+              <a:rPr lang="en-US" sz="3600" dirty="0" smtClean="0"/>
+              <a:t>2-Term Months – Univariate Analysis</a:t>
+            </a:r>
+            <a:endParaRPr lang="en-US" sz="3600" dirty="0"/>
+          </a:p>
+        </p:txBody>
+      </p:sp>
+      <p:sp>
+        <p:nvSpPr>
+          <p:cNvPr id="5" name="Text Placeholder 4"/>
+          <p:cNvSpPr>
+            <a:spLocks noGrp="1"/>
+          </p:cNvSpPr>
+          <p:nvPr>
+            <p:ph type="body" idx="1"/>
+          </p:nvPr>
+        </p:nvSpPr>
+        <p:spPr/>
+        <p:txBody>
+          <a:bodyPr>
+            <a:noAutofit/>
+          </a:bodyPr>
+          <a:lstStyle/>
+          <a:p>
+            <a:r>
+              <a:rPr lang="en-US" sz="1500" dirty="0" smtClean="0">
+                <a:effectLst>
+                  <a:outerShdw blurRad="38100" dist="38100" dir="2700000" algn="tl">
+                    <a:srgbClr val="000000">
+                      <a:alpha val="43137"/>
+                    </a:srgbClr>
+                  </a:outerShdw>
+                </a:effectLst>
+              </a:rPr>
+              <a:t>Defaulter tend to take more 60 term period </a:t>
+            </a:r>
+            <a:br>
+              <a:rPr lang="en-US" sz="1500" dirty="0" smtClean="0">
+                <a:effectLst>
+                  <a:outerShdw blurRad="38100" dist="38100" dir="2700000" algn="tl">
+                    <a:srgbClr val="000000">
+                      <a:alpha val="43137"/>
+                    </a:srgbClr>
+                  </a:outerShdw>
+                </a:effectLst>
+              </a:rPr>
+            </a:br>
+            <a:r>
+              <a:rPr lang="en-US" sz="1500" dirty="0" smtClean="0">
+                <a:effectLst>
+                  <a:outerShdw blurRad="38100" dist="38100" dir="2700000" algn="tl">
+                    <a:srgbClr val="000000">
+                      <a:alpha val="43137"/>
+                    </a:srgbClr>
+                  </a:outerShdw>
+                </a:effectLst>
+              </a:rPr>
+              <a:t>loan</a:t>
+            </a:r>
+            <a:endParaRPr lang="en-US" sz="1500" dirty="0">
+              <a:effectLst>
+                <a:outerShdw blurRad="38100" dist="38100" dir="2700000" algn="tl">
+                  <a:srgbClr val="000000">
+                    <a:alpha val="43137"/>
+                  </a:srgbClr>
+                </a:outerShdw>
+              </a:effectLst>
+              <a:latin typeface="Arial Black" panose="020B0A04020102020204" pitchFamily="34" charset="0"/>
+            </a:endParaRPr>
+          </a:p>
+        </p:txBody>
+      </p:sp>
+      <p:sp>
+        <p:nvSpPr>
+          <p:cNvPr id="6" name="Text Placeholder 5"/>
+          <p:cNvSpPr>
+            <a:spLocks noGrp="1"/>
+          </p:cNvSpPr>
+          <p:nvPr>
+            <p:ph type="body" sz="quarter" idx="3"/>
+          </p:nvPr>
+        </p:nvSpPr>
+        <p:spPr>
+          <a:xfrm>
+            <a:off x="4800600" y="1535113"/>
+            <a:ext cx="3886200" cy="639762"/>
+          </a:xfrm>
+        </p:spPr>
+        <p:txBody>
+          <a:bodyPr>
+            <a:normAutofit/>
+          </a:bodyPr>
+          <a:lstStyle/>
+          <a:p>
+            <a:r>
+              <a:rPr lang="en-US" sz="1500" dirty="0" smtClean="0">
+                <a:effectLst>
+                  <a:outerShdw blurRad="38100" dist="38100" dir="2700000" algn="tl">
+                    <a:srgbClr val="000000">
+                      <a:alpha val="43137"/>
+                    </a:srgbClr>
+                  </a:outerShdw>
+                </a:effectLst>
+              </a:rPr>
+              <a:t>Non-Defaulters tend to take 36 term period loan</a:t>
+            </a:r>
+            <a:endParaRPr lang="en-US" sz="1500" dirty="0">
+              <a:effectLst>
+                <a:outerShdw blurRad="38100" dist="38100" dir="2700000" algn="tl">
+                  <a:srgbClr val="000000">
+                    <a:alpha val="43137"/>
+                  </a:srgbClr>
+                </a:outerShdw>
+              </a:effectLst>
+            </a:endParaRPr>
+          </a:p>
+        </p:txBody>
+      </p:sp>
+      <p:pic>
+        <p:nvPicPr>
+          <p:cNvPr id="4098" name="Picture 2"/>
+          <p:cNvPicPr>
+            <a:picLocks noGrp="1" noChangeAspect="1" noChangeArrowheads="1"/>
+          </p:cNvPicPr>
+          <p:nvPr>
+            <p:ph sz="half" idx="2"/>
+          </p:nvPr>
+        </p:nvPicPr>
+        <p:blipFill>
+          <a:blip r:embed="rId2">
+            <a:extLst>
+              <a:ext uri="{28A0092B-C50C-407E-A947-70E740481C1C}">
+                <a14:useLocalDpi xmlns:a14="http://schemas.microsoft.com/office/drawing/2010/main" val="0"/>
+              </a:ext>
+            </a:extLst>
+          </a:blip>
+          <a:srcRect/>
+          <a:stretch>
+            <a:fillRect/>
+          </a:stretch>
+        </p:blipFill>
+        <p:spPr bwMode="auto">
+          <a:xfrm>
+            <a:off x="228600" y="2209800"/>
+            <a:ext cx="4040188" cy="4114800"/>
+          </a:xfrm>
+          <a:prstGeom prst="rect">
+            <a:avLst/>
+          </a:prstGeom>
+          <a:noFill/>
+          <a:ln>
+            <a:noFill/>
+          </a:ln>
+          <a:extLst>
+            <a:ext uri="{909E8E84-426E-40DD-AFC4-6F175D3DCCD1}">
+              <a14:hiddenFill xmlns:a14="http://schemas.microsoft.com/office/drawing/2010/main">
+                <a:solidFill>
+                  <a:schemeClr val="accent1"/>
+                </a:solidFill>
+              </a14:hiddenFill>
+            </a:ext>
+            <a:ext uri="{91240B29-F687-4F45-9708-019B960494DF}">
+              <a14:hiddenLine xmlns:a14="http://schemas.microsoft.com/office/drawing/2010/main" w="9525">
+                <a:solidFill>
+                  <a:schemeClr val="tx1"/>
+                </a:solidFill>
+                <a:miter lim="800000"/>
+                <a:headEnd/>
+                <a:tailEnd/>
+              </a14:hiddenLine>
+            </a:ext>
+          </a:extLst>
+        </p:spPr>
+      </p:pic>
+      <p:pic>
+        <p:nvPicPr>
+          <p:cNvPr id="4099" name="Picture 3"/>
+          <p:cNvPicPr>
+            <a:picLocks noGrp="1" noChangeAspect="1" noChangeArrowheads="1"/>
+          </p:cNvPicPr>
+          <p:nvPr>
+            <p:ph sz="quarter" idx="4"/>
+          </p:nvPr>
+        </p:nvPicPr>
+        <p:blipFill>
+          <a:blip r:embed="rId3">
+            <a:extLst>
+              <a:ext uri="{28A0092B-C50C-407E-A947-70E740481C1C}">
+                <a14:useLocalDpi xmlns:a14="http://schemas.microsoft.com/office/drawing/2010/main" val="0"/>
+              </a:ext>
+            </a:extLst>
+          </a:blip>
+          <a:srcRect/>
+          <a:stretch>
+            <a:fillRect/>
+          </a:stretch>
+        </p:blipFill>
+        <p:spPr bwMode="auto">
+          <a:xfrm>
+            <a:off x="4648200" y="2286000"/>
+            <a:ext cx="4279233" cy="4114800"/>
+          </a:xfrm>
+          <a:prstGeom prst="rect">
+            <a:avLst/>
+          </a:prstGeom>
+          <a:noFill/>
+          <a:ln>
+            <a:noFill/>
+          </a:ln>
+          <a:extLst>
+            <a:ext uri="{909E8E84-426E-40DD-AFC4-6F175D3DCCD1}">
+              <a14:hiddenFill xmlns:a14="http://schemas.microsoft.com/office/drawing/2010/main">
+                <a:solidFill>
+                  <a:schemeClr val="accent1"/>
+                </a:solidFill>
+              </a14:hiddenFill>
+            </a:ext>
+            <a:ext uri="{91240B29-F687-4F45-9708-019B960494DF}">
+              <a14:hiddenLine xmlns:a14="http://schemas.microsoft.com/office/drawing/2010/main" w="9525">
+                <a:solidFill>
+                  <a:schemeClr val="tx1"/>
+                </a:solidFill>
+                <a:miter lim="800000"/>
+                <a:headEnd/>
+                <a:tailEnd/>
+              </a14:hiddenLine>
+            </a:ext>
+          </a:extLst>
+        </p:spPr>
+      </p:pic>
+    </p:spTree>
+    <p:extLst>
+      <p:ext uri="{BB962C8B-B14F-4D97-AF65-F5344CB8AC3E}">
+        <p14:creationId xmlns:p14="http://schemas.microsoft.com/office/powerpoint/2010/main" val="2596251854"/>
+      </p:ext>
+    </p:extLst>
+  </p:cSld>
+  <p:clrMapOvr>
+    <a:masterClrMapping/>
+  </p:clrMapOvr>
+  <p:timing>
+    <p:tnLst>
+      <p:par>
+        <p:cTn id="1" dur="indefinite" restart="never" nodeType="tmRoot"/>
+      </p:par>
+    </p:tnLst>
+  </p:timing>
+</p:sld>
+</file>
+
+<file path=ppt/slides/slide7.xml><?xml version="1.0" encoding="utf-8"?>
+<p:sld xmlns:a="http://schemas.openxmlformats.org/drawingml/2006/main" xmlns:r="http://schemas.openxmlformats.org/officeDocument/2006/relationships" xmlns:p="http://schemas.openxmlformats.org/presentationml/2006/main">
+  <p:cSld>
+    <p:spTree>
+      <p:nvGrpSpPr>
+        <p:cNvPr id="1" name=""/>
+        <p:cNvGrpSpPr/>
+        <p:nvPr/>
+      </p:nvGrpSpPr>
+      <p:grpSpPr>
+        <a:xfrm>
+          <a:off x="0" y="0"/>
+          <a:ext cx="0" cy="0"/>
+          <a:chOff x="0" y="0"/>
+          <a:chExt cx="0" cy="0"/>
+        </a:xfrm>
+      </p:grpSpPr>
+      <p:sp>
+        <p:nvSpPr>
+          <p:cNvPr id="2" name="Title 1"/>
+          <p:cNvSpPr>
+            <a:spLocks noGrp="1"/>
+          </p:cNvSpPr>
+          <p:nvPr>
+            <p:ph type="title"/>
+          </p:nvPr>
+        </p:nvSpPr>
+        <p:spPr/>
+        <p:txBody>
+          <a:bodyPr>
+            <a:normAutofit/>
+          </a:bodyPr>
+          <a:lstStyle/>
+          <a:p>
+            <a:r>
+              <a:rPr lang="en-US" sz="3600" dirty="0" smtClean="0"/>
+              <a:t>Factor </a:t>
+            </a:r>
+            <a:r>
+              <a:rPr lang="en-US" sz="3600" dirty="0" smtClean="0"/>
+              <a:t>3 – Loan Amount</a:t>
+            </a:r>
+            <a:endParaRPr lang="en-US" sz="3600" dirty="0"/>
+          </a:p>
+        </p:txBody>
+      </p:sp>
+      <p:sp>
+        <p:nvSpPr>
+          <p:cNvPr id="7" name="Content Placeholder 6"/>
+          <p:cNvSpPr>
+            <a:spLocks noGrp="1"/>
+          </p:cNvSpPr>
+          <p:nvPr>
+            <p:ph idx="1"/>
+          </p:nvPr>
+        </p:nvSpPr>
+        <p:spPr/>
+        <p:txBody>
+          <a:bodyPr/>
+          <a:lstStyle/>
+          <a:p>
+            <a:r>
+              <a:rPr lang="en-US" dirty="0" smtClean="0"/>
+              <a:t>Defaulters tend to take more loan</a:t>
+            </a:r>
+          </a:p>
+          <a:p>
+            <a:endParaRPr lang="en-US" dirty="0"/>
+          </a:p>
+          <a:p>
+            <a:endParaRPr lang="en-US" dirty="0"/>
+          </a:p>
+        </p:txBody>
+      </p:sp>
+      <p:pic>
+        <p:nvPicPr>
+          <p:cNvPr id="5122" name="Picture 2"/>
+          <p:cNvPicPr>
+            <a:picLocks noChangeAspect="1" noChangeArrowheads="1"/>
+          </p:cNvPicPr>
+          <p:nvPr/>
+        </p:nvPicPr>
+        <p:blipFill>
+          <a:blip r:embed="rId2">
+            <a:extLst>
+              <a:ext uri="{28A0092B-C50C-407E-A947-70E740481C1C}">
+                <a14:useLocalDpi xmlns:a14="http://schemas.microsoft.com/office/drawing/2010/main" val="0"/>
+              </a:ext>
+            </a:extLst>
+          </a:blip>
+          <a:srcRect/>
+          <a:stretch>
+            <a:fillRect/>
+          </a:stretch>
+        </p:blipFill>
+        <p:spPr bwMode="auto">
+          <a:xfrm>
+            <a:off x="1447800" y="2209800"/>
+            <a:ext cx="5600700" cy="4000500"/>
+          </a:xfrm>
+          <a:prstGeom prst="rect">
+            <a:avLst/>
+          </a:prstGeom>
+          <a:noFill/>
+          <a:ln>
+            <a:noFill/>
+          </a:ln>
+          <a:extLst>
+            <a:ext uri="{909E8E84-426E-40DD-AFC4-6F175D3DCCD1}">
+              <a14:hiddenFill xmlns:a14="http://schemas.microsoft.com/office/drawing/2010/main">
+                <a:solidFill>
+                  <a:schemeClr val="accent1"/>
+                </a:solidFill>
+              </a14:hiddenFill>
+            </a:ext>
+            <a:ext uri="{91240B29-F687-4F45-9708-019B960494DF}">
+              <a14:hiddenLine xmlns:a14="http://schemas.microsoft.com/office/drawing/2010/main" w="9525">
+                <a:solidFill>
+                  <a:schemeClr val="tx1"/>
+                </a:solidFill>
+                <a:miter lim="800000"/>
+                <a:headEnd/>
+                <a:tailEnd/>
+              </a14:hiddenLine>
+            </a:ext>
+          </a:extLst>
+        </p:spPr>
+      </p:pic>
+    </p:spTree>
+    <p:extLst>
+      <p:ext uri="{BB962C8B-B14F-4D97-AF65-F5344CB8AC3E}">
+        <p14:creationId xmlns:p14="http://schemas.microsoft.com/office/powerpoint/2010/main" val="1986953037"/>
+      </p:ext>
+    </p:extLst>
+  </p:cSld>
+  <p:clrMapOvr>
+    <a:masterClrMapping/>
+  </p:clrMapOvr>
+  <p:timing>
+    <p:tnLst>
+      <p:par>
+        <p:cTn id="1" dur="indefinite" restart="never" nodeType="tmRoot"/>
+      </p:par>
+    </p:tnLst>
+  </p:timing>
+</p:sld>
+</file>
+
+<file path=ppt/slides/slide8.xml><?xml version="1.0" encoding="utf-8"?>
+<p:sld xmlns:a="http://schemas.openxmlformats.org/drawingml/2006/main" xmlns:r="http://schemas.openxmlformats.org/officeDocument/2006/relationships" xmlns:p="http://schemas.openxmlformats.org/presentationml/2006/main">
+  <p:cSld>
+    <p:spTree>
+      <p:nvGrpSpPr>
+        <p:cNvPr id="1" name=""/>
+        <p:cNvGrpSpPr/>
+        <p:nvPr/>
+      </p:nvGrpSpPr>
+      <p:grpSpPr>
+        <a:xfrm>
+          <a:off x="0" y="0"/>
+          <a:ext cx="0" cy="0"/>
+          <a:chOff x="0" y="0"/>
+          <a:chExt cx="0" cy="0"/>
+        </a:xfrm>
+      </p:grpSpPr>
+      <p:sp>
+        <p:nvSpPr>
+          <p:cNvPr id="4" name="Title 3"/>
+          <p:cNvSpPr>
+            <a:spLocks noGrp="1"/>
+          </p:cNvSpPr>
+          <p:nvPr>
+            <p:ph type="title"/>
+          </p:nvPr>
+        </p:nvSpPr>
+        <p:spPr>
+          <a:xfrm>
+            <a:off x="457200" y="274638"/>
+            <a:ext cx="8229600" cy="1630362"/>
+          </a:xfrm>
+        </p:spPr>
+        <p:txBody>
+          <a:bodyPr>
+            <a:noAutofit/>
+          </a:bodyPr>
+          <a:lstStyle/>
+          <a:p>
+            <a:r>
+              <a:rPr lang="en-US" sz="3600" dirty="0" smtClean="0"/>
+              <a:t>Factor – 4</a:t>
+            </a:r>
+            <a:br>
+              <a:rPr lang="en-US" sz="3600" dirty="0" smtClean="0"/>
+            </a:br>
+            <a:r>
+              <a:rPr lang="en-US" sz="3600" dirty="0" smtClean="0"/>
+              <a:t>Home-Ownership- No Impact</a:t>
+            </a:r>
+            <a:br>
+              <a:rPr lang="en-US" sz="3600" dirty="0" smtClean="0"/>
+            </a:br>
+            <a:r>
+              <a:rPr lang="en-US" sz="3600" dirty="0" smtClean="0"/>
+              <a:t> </a:t>
+            </a:r>
+            <a:endParaRPr lang="en-US" sz="3600" dirty="0"/>
+          </a:p>
+        </p:txBody>
+      </p:sp>
+      <p:pic>
+        <p:nvPicPr>
+          <p:cNvPr id="6146" name="Picture 2"/>
+          <p:cNvPicPr>
+            <a:picLocks noGrp="1" noChangeAspect="1" noChangeArrowheads="1"/>
+          </p:cNvPicPr>
+          <p:nvPr>
+            <p:ph sz="half" idx="1"/>
+          </p:nvPr>
+        </p:nvPicPr>
+        <p:blipFill>
+          <a:blip r:embed="rId2">
+            <a:extLst>
+              <a:ext uri="{28A0092B-C50C-407E-A947-70E740481C1C}">
+                <a14:useLocalDpi xmlns:a14="http://schemas.microsoft.com/office/drawing/2010/main" val="0"/>
+              </a:ext>
+            </a:extLst>
+          </a:blip>
+          <a:srcRect/>
+          <a:stretch>
+            <a:fillRect/>
+          </a:stretch>
+        </p:blipFill>
+        <p:spPr bwMode="auto">
+          <a:xfrm>
+            <a:off x="457200" y="1447800"/>
+            <a:ext cx="4038600" cy="4114800"/>
+          </a:xfrm>
+          <a:prstGeom prst="rect">
+            <a:avLst/>
+          </a:prstGeom>
+          <a:noFill/>
+          <a:ln>
+            <a:noFill/>
+          </a:ln>
+          <a:extLst>
+            <a:ext uri="{909E8E84-426E-40DD-AFC4-6F175D3DCCD1}">
+              <a14:hiddenFill xmlns:a14="http://schemas.microsoft.com/office/drawing/2010/main">
+                <a:solidFill>
+                  <a:schemeClr val="accent1"/>
+                </a:solidFill>
+              </a14:hiddenFill>
+            </a:ext>
+            <a:ext uri="{91240B29-F687-4F45-9708-019B960494DF}">
+              <a14:hiddenLine xmlns:a14="http://schemas.microsoft.com/office/drawing/2010/main" w="9525">
+                <a:solidFill>
+                  <a:schemeClr val="tx1"/>
+                </a:solidFill>
+                <a:miter lim="800000"/>
+                <a:headEnd/>
+                <a:tailEnd/>
+              </a14:hiddenLine>
+            </a:ext>
+          </a:extLst>
+        </p:spPr>
+      </p:pic>
+      <p:pic>
+        <p:nvPicPr>
+          <p:cNvPr id="6147" name="Picture 3"/>
+          <p:cNvPicPr>
+            <a:picLocks noGrp="1" noChangeAspect="1" noChangeArrowheads="1"/>
+          </p:cNvPicPr>
+          <p:nvPr>
+            <p:ph sz="half" idx="2"/>
+          </p:nvPr>
+        </p:nvPicPr>
+        <p:blipFill>
+          <a:blip r:embed="rId3">
+            <a:extLst>
+              <a:ext uri="{28A0092B-C50C-407E-A947-70E740481C1C}">
+                <a14:useLocalDpi xmlns:a14="http://schemas.microsoft.com/office/drawing/2010/main" val="0"/>
+              </a:ext>
+            </a:extLst>
+          </a:blip>
+          <a:srcRect/>
+          <a:stretch>
+            <a:fillRect/>
+          </a:stretch>
+        </p:blipFill>
+        <p:spPr bwMode="auto">
+          <a:xfrm>
+            <a:off x="4648200" y="1600200"/>
+            <a:ext cx="4038600" cy="3962400"/>
+          </a:xfrm>
+          <a:prstGeom prst="rect">
+            <a:avLst/>
+          </a:prstGeom>
+          <a:noFill/>
+          <a:ln>
+            <a:noFill/>
+          </a:ln>
+          <a:extLst>
+            <a:ext uri="{909E8E84-426E-40DD-AFC4-6F175D3DCCD1}">
+              <a14:hiddenFill xmlns:a14="http://schemas.microsoft.com/office/drawing/2010/main">
+                <a:solidFill>
+                  <a:schemeClr val="accent1"/>
+                </a:solidFill>
+              </a14:hiddenFill>
+            </a:ext>
+            <a:ext uri="{91240B29-F687-4F45-9708-019B960494DF}">
+              <a14:hiddenLine xmlns:a14="http://schemas.microsoft.com/office/drawing/2010/main" w="9525">
+                <a:solidFill>
+                  <a:schemeClr val="tx1"/>
+                </a:solidFill>
+                <a:miter lim="800000"/>
+                <a:headEnd/>
+                <a:tailEnd/>
+              </a14:hiddenLine>
+            </a:ext>
+          </a:extLst>
+        </p:spPr>
+      </p:pic>
+    </p:spTree>
+    <p:extLst>
+      <p:ext uri="{BB962C8B-B14F-4D97-AF65-F5344CB8AC3E}">
+        <p14:creationId xmlns:p14="http://schemas.microsoft.com/office/powerpoint/2010/main" val="2219486312"/>
+      </p:ext>
+    </p:extLst>
+  </p:cSld>
+  <p:clrMapOvr>
+    <a:masterClrMapping/>
+  </p:clrMapOvr>
+  <p:timing>
+    <p:tnLst>
+      <p:par>
+        <p:cTn id="1" dur="indefinite" restart="never" nodeType="tmRoot"/>
+      </p:par>
+    </p:tnLst>
+  </p:timing>
+</p:sld>
+</file>
+
+<file path=ppt/slides/slide9.xml><?xml version="1.0" encoding="utf-8"?>
+<p:sld xmlns:a="http://schemas.openxmlformats.org/drawingml/2006/main" xmlns:r="http://schemas.openxmlformats.org/officeDocument/2006/relationships" xmlns:p="http://schemas.openxmlformats.org/presentationml/2006/main">
+  <p:cSld>
+    <p:spTree>
+      <p:nvGrpSpPr>
+        <p:cNvPr id="1" name=""/>
+        <p:cNvGrpSpPr/>
+        <p:nvPr/>
+      </p:nvGrpSpPr>
+      <p:grpSpPr>
+        <a:xfrm>
+          <a:off x="0" y="0"/>
+          <a:ext cx="0" cy="0"/>
+          <a:chOff x="0" y="0"/>
+          <a:chExt cx="0" cy="0"/>
+        </a:xfrm>
+      </p:grpSpPr>
+      <p:sp>
+        <p:nvSpPr>
+          <p:cNvPr id="2" name="Title 1"/>
+          <p:cNvSpPr>
+            <a:spLocks noGrp="1"/>
+          </p:cNvSpPr>
+          <p:nvPr>
+            <p:ph type="title"/>
+          </p:nvPr>
+        </p:nvSpPr>
+        <p:spPr/>
+        <p:txBody>
+          <a:bodyPr/>
+          <a:lstStyle/>
+          <a:p>
+            <a:r>
+              <a:rPr lang="en-US" dirty="0" smtClean="0"/>
+              <a:t>Factor -4 – Source Verified</a:t>
+            </a:r>
+            <a:endParaRPr lang="en-US" dirty="0"/>
+          </a:p>
+        </p:txBody>
+      </p:sp>
+      <p:pic>
+        <p:nvPicPr>
+          <p:cNvPr id="7170" name="Picture 2"/>
+          <p:cNvPicPr>
+            <a:picLocks noGrp="1" noChangeAspect="1" noChangeArrowheads="1"/>
+          </p:cNvPicPr>
+          <p:nvPr>
+            <p:ph sz="half" idx="1"/>
+          </p:nvPr>
+        </p:nvPicPr>
+        <p:blipFill>
+          <a:blip r:embed="rId2">
+            <a:extLst>
+              <a:ext uri="{28A0092B-C50C-407E-A947-70E740481C1C}">
+                <a14:useLocalDpi xmlns:a14="http://schemas.microsoft.com/office/drawing/2010/main" val="0"/>
+              </a:ext>
+            </a:extLst>
+          </a:blip>
+          <a:srcRect/>
+          <a:stretch>
+            <a:fillRect/>
+          </a:stretch>
+        </p:blipFill>
+        <p:spPr bwMode="auto">
+          <a:xfrm>
+            <a:off x="457200" y="2440950"/>
+            <a:ext cx="4038600" cy="2844462"/>
+          </a:xfrm>
+          <a:prstGeom prst="rect">
+            <a:avLst/>
+          </a:prstGeom>
+          <a:noFill/>
+          <a:ln>
+            <a:noFill/>
+          </a:ln>
+          <a:extLst>
+            <a:ext uri="{909E8E84-426E-40DD-AFC4-6F175D3DCCD1}">
+              <a14:hiddenFill xmlns:a14="http://schemas.microsoft.com/office/drawing/2010/main">
+                <a:solidFill>
+                  <a:schemeClr val="accent1"/>
+                </a:solidFill>
+              </a14:hiddenFill>
+            </a:ext>
+            <a:ext uri="{91240B29-F687-4F45-9708-019B960494DF}">
+              <a14:hiddenLine xmlns:a14="http://schemas.microsoft.com/office/drawing/2010/main" w="9525">
+                <a:solidFill>
+                  <a:schemeClr val="tx1"/>
+                </a:solidFill>
+                <a:miter lim="800000"/>
+                <a:headEnd/>
+                <a:tailEnd/>
+              </a14:hiddenLine>
+            </a:ext>
+          </a:extLst>
+        </p:spPr>
+      </p:pic>
+      <p:pic>
+        <p:nvPicPr>
+          <p:cNvPr id="7171" name="Picture 3"/>
+          <p:cNvPicPr>
+            <a:picLocks noGrp="1" noChangeAspect="1" noChangeArrowheads="1"/>
+          </p:cNvPicPr>
+          <p:nvPr>
+            <p:ph sz="half" idx="2"/>
+          </p:nvPr>
+        </p:nvPicPr>
+        <p:blipFill>
+          <a:blip r:embed="rId3">
+            <a:extLst>
+              <a:ext uri="{28A0092B-C50C-407E-A947-70E740481C1C}">
+                <a14:useLocalDpi xmlns:a14="http://schemas.microsoft.com/office/drawing/2010/main" val="0"/>
+              </a:ext>
+            </a:extLst>
+          </a:blip>
+          <a:srcRect/>
+          <a:stretch>
+            <a:fillRect/>
+          </a:stretch>
+        </p:blipFill>
+        <p:spPr bwMode="auto">
+          <a:xfrm>
+            <a:off x="4724400" y="2438400"/>
+            <a:ext cx="4038600" cy="3408101"/>
+          </a:xfrm>
+          <a:prstGeom prst="rect">
+            <a:avLst/>
+          </a:prstGeom>
+          <a:noFill/>
+          <a:ln>
+            <a:noFill/>
+          </a:ln>
+          <a:extLst>
+            <a:ext uri="{909E8E84-426E-40DD-AFC4-6F175D3DCCD1}">
+              <a14:hiddenFill xmlns:a14="http://schemas.microsoft.com/office/drawing/2010/main">
+                <a:solidFill>
+                  <a:schemeClr val="accent1"/>
+                </a:solidFill>
+              </a14:hiddenFill>
+            </a:ext>
+            <a:ext uri="{91240B29-F687-4F45-9708-019B960494DF}">
+              <a14:hiddenLine xmlns:a14="http://schemas.microsoft.com/office/drawing/2010/main" w="9525">
+                <a:solidFill>
+                  <a:schemeClr val="tx1"/>
+                </a:solidFill>
+                <a:miter lim="800000"/>
+                <a:headEnd/>
+                <a:tailEnd/>
+              </a14:hiddenLine>
+            </a:ext>
+          </a:extLst>
+        </p:spPr>
+      </p:pic>
+    </p:spTree>
+    <p:extLst>
+      <p:ext uri="{BB962C8B-B14F-4D97-AF65-F5344CB8AC3E}">
+        <p14:creationId xmlns:p14="http://schemas.microsoft.com/office/powerpoint/2010/main" val="3663700594"/>
+      </p:ext>
+    </p:extLst>
+  </p:cSld>
+  <p:clrMapOvr>
+    <a:masterClrMapping/>
+  </p:clrMapOvr>
+  <p:timing>
+    <p:tnLst>
+      <p:par>
+        <p:cTn id="1" dur="indefinite" restart="never" nodeType="tmRoot"/>
+      </p:par>
+    </p:tnLst>
+  </p:timing>
 </p:sld>
 </file>
 
@@ -3436,4 +6698,289 @@
   <a:objectDefaults/>
   <a:extraClrSchemeLst/>
 </a:theme>
+</file>
+
+<file path=ppt/theme/theme2.xml><?xml version="1.0" encoding="utf-8"?>
+<a:theme xmlns:a="http://schemas.openxmlformats.org/drawingml/2006/main" name="Office Theme">
+  <a:themeElements>
+    <a:clrScheme name="Office">
+      <a:dk1>
+        <a:sysClr val="windowText" lastClr="000000"/>
+      </a:dk1>
+      <a:lt1>
+        <a:sysClr val="window" lastClr="FFFFFF"/>
+      </a:lt1>
+      <a:dk2>
+        <a:srgbClr val="1F497D"/>
+      </a:dk2>
+      <a:lt2>
+        <a:srgbClr val="EEECE1"/>
+      </a:lt2>
+      <a:accent1>
+        <a:srgbClr val="4F81BD"/>
+      </a:accent1>
+      <a:accent2>
+        <a:srgbClr val="C0504D"/>
+      </a:accent2>
+      <a:accent3>
+        <a:srgbClr val="9BBB59"/>
+      </a:accent3>
+      <a:accent4>
+        <a:srgbClr val="8064A2"/>
+      </a:accent4>
+      <a:accent5>
+        <a:srgbClr val="4BACC6"/>
+      </a:accent5>
+      <a:accent6>
+        <a:srgbClr val="F79646"/>
+      </a:accent6>
+      <a:hlink>
+        <a:srgbClr val="0000FF"/>
+      </a:hlink>
+      <a:folHlink>
+        <a:srgbClr val="800080"/>
+      </a:folHlink>
+    </a:clrScheme>
+    <a:fontScheme name="Office">
+      <a:majorFont>
+        <a:latin typeface="Calibri"/>
+        <a:ea typeface=""/>
+        <a:cs typeface=""/>
+        <a:font script="Jpan" typeface="ＭＳ Ｐゴシック"/>
+        <a:font script="Hang" typeface="맑은 고딕"/>
+        <a:font script="Hans" typeface="宋体"/>
+        <a:font script="Hant" typeface="新細明體"/>
+        <a:font script="Arab" typeface="Times New Roman"/>
+        <a:font script="Hebr" typeface="Times New Roman"/>
+        <a:font script="Thai" typeface="Angsana New"/>
+        <a:font script="Ethi" typeface="Nyala"/>
+        <a:font script="Beng" typeface="Vrinda"/>
+        <a:font script="Gujr" typeface="Shruti"/>
+        <a:font script="Khmr" typeface="MoolBoran"/>
+        <a:font script="Knda" typeface="Tunga"/>
+        <a:font script="Guru" typeface="Raavi"/>
+        <a:font script="Cans" typeface="Euphemia"/>
+        <a:font script="Cher" typeface="Plantagenet Cherokee"/>
+        <a:font script="Yiii" typeface="Microsoft Yi Baiti"/>
+        <a:font script="Tibt" typeface="Microsoft Himalaya"/>
+        <a:font script="Thaa" typeface="MV Boli"/>
+        <a:font script="Deva" typeface="Mangal"/>
+        <a:font script="Telu" typeface="Gautami"/>
+        <a:font script="Taml" typeface="Latha"/>
+        <a:font script="Syrc" typeface="Estrangelo Edessa"/>
+        <a:font script="Orya" typeface="Kalinga"/>
+        <a:font script="Mlym" typeface="Kartika"/>
+        <a:font script="Laoo" typeface="DokChampa"/>
+        <a:font script="Sinh" typeface="Iskoola Pota"/>
+        <a:font script="Mong" typeface="Mongolian Baiti"/>
+        <a:font script="Viet" typeface="Times New Roman"/>
+        <a:font script="Uigh" typeface="Microsoft Uighur"/>
+        <a:font script="Geor" typeface="Sylfaen"/>
+      </a:majorFont>
+      <a:minorFont>
+        <a:latin typeface="Calibri"/>
+        <a:ea typeface=""/>
+        <a:cs typeface=""/>
+        <a:font script="Jpan" typeface="ＭＳ Ｐゴシック"/>
+        <a:font script="Hang" typeface="맑은 고딕"/>
+        <a:font script="Hans" typeface="宋体"/>
+        <a:font script="Hant" typeface="新細明體"/>
+        <a:font script="Arab" typeface="Arial"/>
+        <a:font script="Hebr" typeface="Arial"/>
+        <a:font script="Thai" typeface="Cordia New"/>
+        <a:font script="Ethi" typeface="Nyala"/>
+        <a:font script="Beng" typeface="Vrinda"/>
+        <a:font script="Gujr" typeface="Shruti"/>
+        <a:font script="Khmr" typeface="DaunPenh"/>
+        <a:font script="Knda" typeface="Tunga"/>
+        <a:font script="Guru" typeface="Raavi"/>
+        <a:font script="Cans" typeface="Euphemia"/>
+        <a:font script="Cher" typeface="Plantagenet Cherokee"/>
+        <a:font script="Yiii" typeface="Microsoft Yi Baiti"/>
+        <a:font script="Tibt" typeface="Microsoft Himalaya"/>
+        <a:font script="Thaa" typeface="MV Boli"/>
+        <a:font script="Deva" typeface="Mangal"/>
+        <a:font script="Telu" typeface="Gautami"/>
+        <a:font script="Taml" typeface="Latha"/>
+        <a:font script="Syrc" typeface="Estrangelo Edessa"/>
+        <a:font script="Orya" typeface="Kalinga"/>
+        <a:font script="Mlym" typeface="Kartika"/>
+        <a:font script="Laoo" typeface="DokChampa"/>
+        <a:font script="Sinh" typeface="Iskoola Pota"/>
+        <a:font script="Mong" typeface="Mongolian Baiti"/>
+        <a:font script="Viet" typeface="Arial"/>
+        <a:font script="Uigh" typeface="Microsoft Uighur"/>
+        <a:font script="Geor" typeface="Sylfaen"/>
+      </a:minorFont>
+    </a:fontScheme>
+    <a:fmtScheme name="Office">
+      <a:fillStyleLst>
+        <a:solidFill>
+          <a:schemeClr val="phClr"/>
+        </a:solidFill>
+        <a:gradFill rotWithShape="1">
+          <a:gsLst>
+            <a:gs pos="0">
+              <a:schemeClr val="phClr">
+                <a:tint val="50000"/>
+                <a:satMod val="300000"/>
+              </a:schemeClr>
+            </a:gs>
+            <a:gs pos="35000">
+              <a:schemeClr val="phClr">
+                <a:tint val="37000"/>
+                <a:satMod val="300000"/>
+              </a:schemeClr>
+            </a:gs>
+            <a:gs pos="100000">
+              <a:schemeClr val="phClr">
+                <a:tint val="15000"/>
+                <a:satMod val="350000"/>
+              </a:schemeClr>
+            </a:gs>
+          </a:gsLst>
+          <a:lin ang="16200000" scaled="1"/>
+        </a:gradFill>
+        <a:gradFill rotWithShape="1">
+          <a:gsLst>
+            <a:gs pos="0">
+              <a:schemeClr val="phClr">
+                <a:shade val="51000"/>
+                <a:satMod val="130000"/>
+              </a:schemeClr>
+            </a:gs>
+            <a:gs pos="80000">
+              <a:schemeClr val="phClr">
+                <a:shade val="93000"/>
+                <a:satMod val="130000"/>
+              </a:schemeClr>
+            </a:gs>
+            <a:gs pos="100000">
+              <a:schemeClr val="phClr">
+                <a:shade val="94000"/>
+                <a:satMod val="135000"/>
+              </a:schemeClr>
+            </a:gs>
+          </a:gsLst>
+          <a:lin ang="16200000" scaled="0"/>
+        </a:gradFill>
+      </a:fillStyleLst>
+      <a:lnStyleLst>
+        <a:ln w="9525" cap="flat" cmpd="sng" algn="ctr">
+          <a:solidFill>
+            <a:schemeClr val="phClr">
+              <a:shade val="95000"/>
+              <a:satMod val="105000"/>
+            </a:schemeClr>
+          </a:solidFill>
+          <a:prstDash val="solid"/>
+        </a:ln>
+        <a:ln w="25400" cap="flat" cmpd="sng" algn="ctr">
+          <a:solidFill>
+            <a:schemeClr val="phClr"/>
+          </a:solidFill>
+          <a:prstDash val="solid"/>
+        </a:ln>
+        <a:ln w="38100" cap="flat" cmpd="sng" algn="ctr">
+          <a:solidFill>
+            <a:schemeClr val="phClr"/>
+          </a:solidFill>
+          <a:prstDash val="solid"/>
+        </a:ln>
+      </a:lnStyleLst>
+      <a:effectStyleLst>
+        <a:effectStyle>
+          <a:effectLst>
+            <a:outerShdw blurRad="40000" dist="20000" dir="5400000" rotWithShape="0">
+              <a:srgbClr val="000000">
+                <a:alpha val="38000"/>
+              </a:srgbClr>
+            </a:outerShdw>
+          </a:effectLst>
+        </a:effectStyle>
+        <a:effectStyle>
+          <a:effectLst>
+            <a:outerShdw blurRad="40000" dist="23000" dir="5400000" rotWithShape="0">
+              <a:srgbClr val="000000">
+                <a:alpha val="35000"/>
+              </a:srgbClr>
+            </a:outerShdw>
+          </a:effectLst>
+        </a:effectStyle>
+        <a:effectStyle>
+          <a:effectLst>
+            <a:outerShdw blurRad="40000" dist="23000" dir="5400000" rotWithShape="0">
+              <a:srgbClr val="000000">
+                <a:alpha val="35000"/>
+              </a:srgbClr>
+            </a:outerShdw>
+          </a:effectLst>
+          <a:scene3d>
+            <a:camera prst="orthographicFront">
+              <a:rot lat="0" lon="0" rev="0"/>
+            </a:camera>
+            <a:lightRig rig="threePt" dir="t">
+              <a:rot lat="0" lon="0" rev="1200000"/>
+            </a:lightRig>
+          </a:scene3d>
+          <a:sp3d>
+            <a:bevelT w="63500" h="25400"/>
+          </a:sp3d>
+        </a:effectStyle>
+      </a:effectStyleLst>
+      <a:bgFillStyleLst>
+        <a:solidFill>
+          <a:schemeClr val="phClr"/>
+        </a:solidFill>
+        <a:gradFill rotWithShape="1">
+          <a:gsLst>
+            <a:gs pos="0">
+              <a:schemeClr val="phClr">
+                <a:tint val="40000"/>
+                <a:satMod val="350000"/>
+              </a:schemeClr>
+            </a:gs>
+            <a:gs pos="40000">
+              <a:schemeClr val="phClr">
+                <a:tint val="45000"/>
+                <a:shade val="99000"/>
+                <a:satMod val="350000"/>
+              </a:schemeClr>
+            </a:gs>
+            <a:gs pos="100000">
+              <a:schemeClr val="phClr">
+                <a:shade val="20000"/>
+                <a:satMod val="255000"/>
+              </a:schemeClr>
+            </a:gs>
+          </a:gsLst>
+          <a:path path="circle">
+            <a:fillToRect l="50000" t="-80000" r="50000" b="180000"/>
+          </a:path>
+        </a:gradFill>
+        <a:gradFill rotWithShape="1">
+          <a:gsLst>
+            <a:gs pos="0">
+              <a:schemeClr val="phClr">
+                <a:tint val="80000"/>
+                <a:satMod val="300000"/>
+              </a:schemeClr>
+            </a:gs>
+            <a:gs pos="100000">
+              <a:schemeClr val="phClr">
+                <a:shade val="30000"/>
+                <a:satMod val="200000"/>
+              </a:schemeClr>
+            </a:gs>
+          </a:gsLst>
+          <a:path path="circle">
+            <a:fillToRect l="50000" t="50000" r="50000" b="50000"/>
+          </a:path>
+        </a:gradFill>
+      </a:bgFillStyleLst>
+    </a:fmtScheme>
+  </a:themeElements>
+  <a:objectDefaults/>
+  <a:extraClrSchemeLst/>
+</a:theme>
 </file>
</xml_diff>